<commit_message>
Reformat day 3 slides
</commit_message>
<xml_diff>
--- a/Section09/tableauday3.pptx
+++ b/Section09/tableauday3.pptx
@@ -2,7 +2,7 @@
 <file path=ppt/presentation.xml><?xml version="1.0" encoding="utf-8"?>
 <p:presentation xmlns:a="http://schemas.openxmlformats.org/drawingml/2006/main" xmlns:r="http://schemas.openxmlformats.org/officeDocument/2006/relationships" xmlns:p="http://schemas.openxmlformats.org/presentationml/2006/main" saveSubsetFonts="1">
   <p:sldMasterIdLst>
-    <p:sldMasterId id="2147483648" r:id="rId1"/>
+    <p:sldMasterId id="2147483660" r:id="rId1"/>
   </p:sldMasterIdLst>
   <p:sldIdLst>
     <p:sldId id="322" r:id="rId2"/>
@@ -125,6 +125,11 @@
       </a:defRPr>
     </a:lvl9pPr>
   </p:defaultTextStyle>
+  <p:extLst>
+    <p:ext uri="{EFAFB233-063F-42B5-8137-9DF3F51BA10A}">
+      <p15:sldGuideLst xmlns:p15="http://schemas.microsoft.com/office/powerpoint/2012/main"/>
+    </p:ext>
+  </p:extLst>
 </p:presentation>
 </file>
 
@@ -150,7 +155,7 @@
           <p:cNvPr id="2" name="Title 1">
             <a:extLst>
               <a:ext uri="{FF2B5EF4-FFF2-40B4-BE49-F238E27FC236}">
-                <a16:creationId xmlns:a16="http://schemas.microsoft.com/office/drawing/2014/main" id="{53BEA24D-2443-8CF6-147C-3F9DB3C79443}"/>
+                <a16:creationId xmlns:a16="http://schemas.microsoft.com/office/drawing/2014/main" id="{47B674CB-3709-4ACF-BB61-29ADEA3D41BE}"/>
               </a:ext>
             </a:extLst>
           </p:cNvPr>
@@ -163,20 +168,22 @@
         </p:nvSpPr>
         <p:spPr>
           <a:xfrm>
-            <a:off x="1524000" y="1122363"/>
-            <a:ext cx="9144000" cy="2387600"/>
+            <a:off x="1524000" y="1033272"/>
+            <a:ext cx="9144000" cy="2478024"/>
           </a:xfrm>
         </p:spPr>
         <p:txBody>
-          <a:bodyPr anchor="b"/>
+          <a:bodyPr lIns="0" tIns="0" rIns="0" bIns="0" anchor="b">
+            <a:noAutofit/>
+          </a:bodyPr>
           <a:lstStyle>
             <a:lvl1pPr algn="ctr">
-              <a:defRPr sz="6000"/>
+              <a:defRPr sz="4000" spc="750" baseline="0"/>
             </a:lvl1pPr>
           </a:lstStyle>
           <a:p>
             <a:r>
-              <a:rPr lang="en-US"/>
+              <a:rPr lang="en-US" dirty="0"/>
               <a:t>Click to edit Master title style</a:t>
             </a:r>
           </a:p>
@@ -187,7 +194,7 @@
           <p:cNvPr id="3" name="Subtitle 2">
             <a:extLst>
               <a:ext uri="{FF2B5EF4-FFF2-40B4-BE49-F238E27FC236}">
-                <a16:creationId xmlns:a16="http://schemas.microsoft.com/office/drawing/2014/main" id="{73CA3EAC-BE89-35AC-7ADB-5A5BE3A5D852}"/>
+                <a16:creationId xmlns:a16="http://schemas.microsoft.com/office/drawing/2014/main" id="{E06DA6BE-9B64-48FC-92D1-EF0D426A3974}"/>
               </a:ext>
             </a:extLst>
           </p:cNvPr>
@@ -200,16 +207,25 @@
         </p:nvSpPr>
         <p:spPr>
           <a:xfrm>
-            <a:off x="1524000" y="3602038"/>
-            <a:ext cx="9144000" cy="1655762"/>
+            <a:off x="1524000" y="3822192"/>
+            <a:ext cx="9144000" cy="1435608"/>
           </a:xfrm>
         </p:spPr>
         <p:txBody>
-          <a:bodyPr/>
+          <a:bodyPr lIns="0" tIns="0" rIns="0" bIns="0">
+            <a:normAutofit/>
+          </a:bodyPr>
           <a:lstStyle>
             <a:lvl1pPr marL="0" indent="0" algn="ctr">
+              <a:lnSpc>
+                <a:spcPct val="150000"/>
+              </a:lnSpc>
               <a:buNone/>
-              <a:defRPr sz="2400"/>
+              <a:defRPr sz="1600" cap="all" spc="600" baseline="0">
+                <a:solidFill>
+                  <a:schemeClr val="tx1"/>
+                </a:solidFill>
+              </a:defRPr>
             </a:lvl1pPr>
             <a:lvl2pPr marL="457200" indent="0" algn="ctr">
               <a:buNone/>
@@ -246,7 +262,7 @@
           </a:lstStyle>
           <a:p>
             <a:r>
-              <a:rPr lang="en-US"/>
+              <a:rPr lang="en-US" dirty="0"/>
               <a:t>Click to edit Master subtitle style</a:t>
             </a:r>
           </a:p>
@@ -257,7 +273,7 @@
           <p:cNvPr id="4" name="Date Placeholder 3">
             <a:extLst>
               <a:ext uri="{FF2B5EF4-FFF2-40B4-BE49-F238E27FC236}">
-                <a16:creationId xmlns:a16="http://schemas.microsoft.com/office/drawing/2014/main" id="{3B48CB70-6915-22E8-DF78-C3448C523CDA}"/>
+                <a16:creationId xmlns:a16="http://schemas.microsoft.com/office/drawing/2014/main" id="{B083AE59-8E21-449F-86DA-5BE297010864}"/>
               </a:ext>
             </a:extLst>
           </p:cNvPr>
@@ -273,9 +289,9 @@
           <a:bodyPr/>
           <a:lstStyle/>
           <a:p>
-            <a:fld id="{1A915F23-DF94-43E3-BA52-ADE72AAD8A76}" type="datetimeFigureOut">
+            <a:fld id="{655A5808-3B61-48CC-92EF-85AC2E0DFA56}" type="datetime2">
               <a:rPr lang="en-US" smtClean="0"/>
-              <a:t>6/9/2022</a:t>
+              <a:t>Wednesday, December 7, 2022</a:t>
             </a:fld>
             <a:endParaRPr lang="en-US"/>
           </a:p>
@@ -286,7 +302,7 @@
           <p:cNvPr id="5" name="Footer Placeholder 4">
             <a:extLst>
               <a:ext uri="{FF2B5EF4-FFF2-40B4-BE49-F238E27FC236}">
-                <a16:creationId xmlns:a16="http://schemas.microsoft.com/office/drawing/2014/main" id="{6D04515A-A06E-EC8F-1292-CC2ED67BD88D}"/>
+                <a16:creationId xmlns:a16="http://schemas.microsoft.com/office/drawing/2014/main" id="{4E8CCD60-9970-49FD-8254-21154BAA1E86}"/>
               </a:ext>
             </a:extLst>
           </p:cNvPr>
@@ -311,7 +327,7 @@
           <p:cNvPr id="6" name="Slide Number Placeholder 5">
             <a:extLst>
               <a:ext uri="{FF2B5EF4-FFF2-40B4-BE49-F238E27FC236}">
-                <a16:creationId xmlns:a16="http://schemas.microsoft.com/office/drawing/2014/main" id="{9BD3868B-ABA4-06CF-B5E6-FEAB86508068}"/>
+                <a16:creationId xmlns:a16="http://schemas.microsoft.com/office/drawing/2014/main" id="{1CC0A488-07A7-42F9-B1DF-68545B75417D}"/>
               </a:ext>
             </a:extLst>
           </p:cNvPr>
@@ -327,7 +343,7 @@
           <a:bodyPr/>
           <a:lstStyle/>
           <a:p>
-            <a:fld id="{068A6475-90B2-4FBC-9E20-58D309396431}" type="slidenum">
+            <a:fld id="{C01389E6-C847-4AD0-B56D-D205B2EAB1EE}" type="slidenum">
               <a:rPr lang="en-US" smtClean="0"/>
               <a:t>‹#›</a:t>
             </a:fld>
@@ -338,13 +354,25 @@
     </p:spTree>
     <p:extLst>
       <p:ext uri="{BB962C8B-B14F-4D97-AF65-F5344CB8AC3E}">
-        <p14:creationId xmlns:p14="http://schemas.microsoft.com/office/powerpoint/2010/main" val="2688318846"/>
+        <p14:creationId xmlns:p14="http://schemas.microsoft.com/office/powerpoint/2010/main" val="1106618023"/>
       </p:ext>
     </p:extLst>
   </p:cSld>
   <p:clrMapOvr>
     <a:masterClrMapping/>
   </p:clrMapOvr>
+  <mc:AlternateContent xmlns:mc="http://schemas.openxmlformats.org/markup-compatibility/2006" xmlns:p14="http://schemas.microsoft.com/office/powerpoint/2010/main">
+    <mc:Choice Requires="p14">
+      <p:transition spd="slow" p14:dur="1500">
+        <p:split orient="vert"/>
+      </p:transition>
+    </mc:Choice>
+    <mc:Fallback xmlns="">
+      <p:transition spd="slow">
+        <p:split orient="vert"/>
+      </p:transition>
+    </mc:Fallback>
+  </mc:AlternateContent>
 </p:sldLayout>
 </file>
 
@@ -370,7 +398,7 @@
           <p:cNvPr id="2" name="Title 1">
             <a:extLst>
               <a:ext uri="{FF2B5EF4-FFF2-40B4-BE49-F238E27FC236}">
-                <a16:creationId xmlns:a16="http://schemas.microsoft.com/office/drawing/2014/main" id="{EC560109-1F94-5593-CA7D-3DB2E0A38140}"/>
+                <a16:creationId xmlns:a16="http://schemas.microsoft.com/office/drawing/2014/main" id="{2B9DC3B6-2D75-4EC4-9120-88DCE0EA61A2}"/>
               </a:ext>
             </a:extLst>
           </p:cNvPr>
@@ -398,7 +426,7 @@
           <p:cNvPr id="3" name="Vertical Text Placeholder 2">
             <a:extLst>
               <a:ext uri="{FF2B5EF4-FFF2-40B4-BE49-F238E27FC236}">
-                <a16:creationId xmlns:a16="http://schemas.microsoft.com/office/drawing/2014/main" id="{9AE35F36-A977-934D-E2EA-DA4D60EADA00}"/>
+                <a16:creationId xmlns:a16="http://schemas.microsoft.com/office/drawing/2014/main" id="{B74B06CB-A0FE-4499-B674-90C8C281A55A}"/>
               </a:ext>
             </a:extLst>
           </p:cNvPr>
@@ -455,7 +483,7 @@
           <p:cNvPr id="4" name="Date Placeholder 3">
             <a:extLst>
               <a:ext uri="{FF2B5EF4-FFF2-40B4-BE49-F238E27FC236}">
-                <a16:creationId xmlns:a16="http://schemas.microsoft.com/office/drawing/2014/main" id="{CF2572AF-C685-C134-9F68-2E08F8CD4E9C}"/>
+                <a16:creationId xmlns:a16="http://schemas.microsoft.com/office/drawing/2014/main" id="{4E7FD700-765A-4DE6-A8EC-9D9D92FCBB42}"/>
               </a:ext>
             </a:extLst>
           </p:cNvPr>
@@ -471,9 +499,9 @@
           <a:bodyPr/>
           <a:lstStyle/>
           <a:p>
-            <a:fld id="{1A915F23-DF94-43E3-BA52-ADE72AAD8A76}" type="datetimeFigureOut">
+            <a:fld id="{735E98AF-4574-4509-BF7A-519ACD5BF826}" type="datetime2">
               <a:rPr lang="en-US" smtClean="0"/>
-              <a:t>6/9/2022</a:t>
+              <a:t>Wednesday, December 7, 2022</a:t>
             </a:fld>
             <a:endParaRPr lang="en-US"/>
           </a:p>
@@ -484,7 +512,7 @@
           <p:cNvPr id="5" name="Footer Placeholder 4">
             <a:extLst>
               <a:ext uri="{FF2B5EF4-FFF2-40B4-BE49-F238E27FC236}">
-                <a16:creationId xmlns:a16="http://schemas.microsoft.com/office/drawing/2014/main" id="{355F0E61-716D-026A-65CB-7BC1BA98C1BD}"/>
+                <a16:creationId xmlns:a16="http://schemas.microsoft.com/office/drawing/2014/main" id="{0C4664EC-C4B1-4D14-9ED3-14C6CCBFFC82}"/>
               </a:ext>
             </a:extLst>
           </p:cNvPr>
@@ -509,7 +537,7 @@
           <p:cNvPr id="6" name="Slide Number Placeholder 5">
             <a:extLst>
               <a:ext uri="{FF2B5EF4-FFF2-40B4-BE49-F238E27FC236}">
-                <a16:creationId xmlns:a16="http://schemas.microsoft.com/office/drawing/2014/main" id="{95FE7689-CFE1-C615-603B-212DBD7781BD}"/>
+                <a16:creationId xmlns:a16="http://schemas.microsoft.com/office/drawing/2014/main" id="{5FDF5526-E518-4133-9F44-D812576C1092}"/>
               </a:ext>
             </a:extLst>
           </p:cNvPr>
@@ -525,7 +553,7 @@
           <a:bodyPr/>
           <a:lstStyle/>
           <a:p>
-            <a:fld id="{068A6475-90B2-4FBC-9E20-58D309396431}" type="slidenum">
+            <a:fld id="{C01389E6-C847-4AD0-B56D-D205B2EAB1EE}" type="slidenum">
               <a:rPr lang="en-US" smtClean="0"/>
               <a:t>‹#›</a:t>
             </a:fld>
@@ -536,13 +564,25 @@
     </p:spTree>
     <p:extLst>
       <p:ext uri="{BB962C8B-B14F-4D97-AF65-F5344CB8AC3E}">
-        <p14:creationId xmlns:p14="http://schemas.microsoft.com/office/powerpoint/2010/main" val="2522723445"/>
+        <p14:creationId xmlns:p14="http://schemas.microsoft.com/office/powerpoint/2010/main" val="856981294"/>
       </p:ext>
     </p:extLst>
   </p:cSld>
   <p:clrMapOvr>
     <a:masterClrMapping/>
   </p:clrMapOvr>
+  <mc:AlternateContent xmlns:mc="http://schemas.openxmlformats.org/markup-compatibility/2006" xmlns:p14="http://schemas.microsoft.com/office/powerpoint/2010/main">
+    <mc:Choice Requires="p14">
+      <p:transition spd="slow" p14:dur="1500">
+        <p:split orient="vert"/>
+      </p:transition>
+    </mc:Choice>
+    <mc:Fallback xmlns="">
+      <p:transition spd="slow">
+        <p:split orient="vert"/>
+      </p:transition>
+    </mc:Fallback>
+  </mc:AlternateContent>
 </p:sldLayout>
 </file>
 
@@ -568,7 +608,7 @@
           <p:cNvPr id="2" name="Vertical Title 1">
             <a:extLst>
               <a:ext uri="{FF2B5EF4-FFF2-40B4-BE49-F238E27FC236}">
-                <a16:creationId xmlns:a16="http://schemas.microsoft.com/office/drawing/2014/main" id="{52689B44-DAAD-CF18-9CBD-9E2AB67A7365}"/>
+                <a16:creationId xmlns:a16="http://schemas.microsoft.com/office/drawing/2014/main" id="{B5F62998-15B1-4CA8-8C60-7801001F8060}"/>
               </a:ext>
             </a:extLst>
           </p:cNvPr>
@@ -581,8 +621,8 @@
         </p:nvSpPr>
         <p:spPr>
           <a:xfrm>
-            <a:off x="8724900" y="365125"/>
-            <a:ext cx="2628900" cy="5811838"/>
+            <a:off x="8724900" y="838899"/>
+            <a:ext cx="2628900" cy="4849301"/>
           </a:xfrm>
         </p:spPr>
         <p:txBody>
@@ -593,6 +633,7 @@
               <a:rPr lang="en-US"/>
               <a:t>Click to edit Master title style</a:t>
             </a:r>
+            <a:endParaRPr lang="en-US" dirty="0"/>
           </a:p>
         </p:txBody>
       </p:sp>
@@ -601,7 +642,7 @@
           <p:cNvPr id="3" name="Vertical Text Placeholder 2">
             <a:extLst>
               <a:ext uri="{FF2B5EF4-FFF2-40B4-BE49-F238E27FC236}">
-                <a16:creationId xmlns:a16="http://schemas.microsoft.com/office/drawing/2014/main" id="{AA6158FA-FECD-475A-5CDD-0A75E18D2468}"/>
+                <a16:creationId xmlns:a16="http://schemas.microsoft.com/office/drawing/2014/main" id="{111AE278-0885-4594-AB09-120344C7D882}"/>
               </a:ext>
             </a:extLst>
           </p:cNvPr>
@@ -614,8 +655,8 @@
         </p:nvSpPr>
         <p:spPr>
           <a:xfrm>
-            <a:off x="838200" y="365125"/>
-            <a:ext cx="7734300" cy="5811838"/>
+            <a:off x="849235" y="838900"/>
+            <a:ext cx="7723265" cy="4849300"/>
           </a:xfrm>
         </p:spPr>
         <p:txBody>
@@ -655,6 +696,7 @@
               <a:rPr lang="en-US"/>
               <a:t>Fifth level</a:t>
             </a:r>
+            <a:endParaRPr lang="en-US" dirty="0"/>
           </a:p>
         </p:txBody>
       </p:sp>
@@ -663,7 +705,7 @@
           <p:cNvPr id="4" name="Date Placeholder 3">
             <a:extLst>
               <a:ext uri="{FF2B5EF4-FFF2-40B4-BE49-F238E27FC236}">
-                <a16:creationId xmlns:a16="http://schemas.microsoft.com/office/drawing/2014/main" id="{3EBFA3C6-C8B6-EE0E-9353-2FDFCAD81AF0}"/>
+                <a16:creationId xmlns:a16="http://schemas.microsoft.com/office/drawing/2014/main" id="{85B850CC-FB43-4988-8D4E-9C54C20185B4}"/>
               </a:ext>
             </a:extLst>
           </p:cNvPr>
@@ -679,9 +721,9 @@
           <a:bodyPr/>
           <a:lstStyle/>
           <a:p>
-            <a:fld id="{1A915F23-DF94-43E3-BA52-ADE72AAD8A76}" type="datetimeFigureOut">
+            <a:fld id="{93DD97D4-9636-490F-85D0-E926C2B6F3B1}" type="datetime2">
               <a:rPr lang="en-US" smtClean="0"/>
-              <a:t>6/9/2022</a:t>
+              <a:t>Wednesday, December 7, 2022</a:t>
             </a:fld>
             <a:endParaRPr lang="en-US"/>
           </a:p>
@@ -692,7 +734,7 @@
           <p:cNvPr id="5" name="Footer Placeholder 4">
             <a:extLst>
               <a:ext uri="{FF2B5EF4-FFF2-40B4-BE49-F238E27FC236}">
-                <a16:creationId xmlns:a16="http://schemas.microsoft.com/office/drawing/2014/main" id="{F5CCD1E2-CCDD-6300-6939-03755DB2F4DE}"/>
+                <a16:creationId xmlns:a16="http://schemas.microsoft.com/office/drawing/2014/main" id="{47A70300-3853-4FB4-A084-CF6E5CF2BDEB}"/>
               </a:ext>
             </a:extLst>
           </p:cNvPr>
@@ -717,7 +759,7 @@
           <p:cNvPr id="6" name="Slide Number Placeholder 5">
             <a:extLst>
               <a:ext uri="{FF2B5EF4-FFF2-40B4-BE49-F238E27FC236}">
-                <a16:creationId xmlns:a16="http://schemas.microsoft.com/office/drawing/2014/main" id="{89397D1D-6F6F-E35C-C872-ACD869E99D72}"/>
+                <a16:creationId xmlns:a16="http://schemas.microsoft.com/office/drawing/2014/main" id="{B7DBAFB0-25AA-4B69-8418-418F47A92700}"/>
               </a:ext>
             </a:extLst>
           </p:cNvPr>
@@ -733,7 +775,7 @@
           <a:bodyPr/>
           <a:lstStyle/>
           <a:p>
-            <a:fld id="{068A6475-90B2-4FBC-9E20-58D309396431}" type="slidenum">
+            <a:fld id="{C01389E6-C847-4AD0-B56D-D205B2EAB1EE}" type="slidenum">
               <a:rPr lang="en-US" smtClean="0"/>
               <a:t>‹#›</a:t>
             </a:fld>
@@ -744,13 +786,25 @@
     </p:spTree>
     <p:extLst>
       <p:ext uri="{BB962C8B-B14F-4D97-AF65-F5344CB8AC3E}">
-        <p14:creationId xmlns:p14="http://schemas.microsoft.com/office/powerpoint/2010/main" val="3556513776"/>
+        <p14:creationId xmlns:p14="http://schemas.microsoft.com/office/powerpoint/2010/main" val="410236878"/>
       </p:ext>
     </p:extLst>
   </p:cSld>
   <p:clrMapOvr>
     <a:masterClrMapping/>
   </p:clrMapOvr>
+  <mc:AlternateContent xmlns:mc="http://schemas.openxmlformats.org/markup-compatibility/2006" xmlns:p14="http://schemas.microsoft.com/office/powerpoint/2010/main">
+    <mc:Choice Requires="p14">
+      <p:transition spd="slow" p14:dur="1500">
+        <p:split orient="vert"/>
+      </p:transition>
+    </mc:Choice>
+    <mc:Fallback xmlns="">
+      <p:transition spd="slow">
+        <p:split orient="vert"/>
+      </p:transition>
+    </mc:Fallback>
+  </mc:AlternateContent>
 </p:sldLayout>
 </file>
 
@@ -776,7 +830,7 @@
           <p:cNvPr id="2" name="Title 1">
             <a:extLst>
               <a:ext uri="{FF2B5EF4-FFF2-40B4-BE49-F238E27FC236}">
-                <a16:creationId xmlns:a16="http://schemas.microsoft.com/office/drawing/2014/main" id="{B1169671-224F-34F3-76DF-2B7CC7DD23BB}"/>
+                <a16:creationId xmlns:a16="http://schemas.microsoft.com/office/drawing/2014/main" id="{CAFE0F35-0AE7-48AB-9005-F1DB4BD0B473}"/>
               </a:ext>
             </a:extLst>
           </p:cNvPr>
@@ -796,6 +850,7 @@
               <a:rPr lang="en-US"/>
               <a:t>Click to edit Master title style</a:t>
             </a:r>
+            <a:endParaRPr lang="en-US" dirty="0"/>
           </a:p>
         </p:txBody>
       </p:sp>
@@ -804,7 +859,7 @@
           <p:cNvPr id="3" name="Content Placeholder 2">
             <a:extLst>
               <a:ext uri="{FF2B5EF4-FFF2-40B4-BE49-F238E27FC236}">
-                <a16:creationId xmlns:a16="http://schemas.microsoft.com/office/drawing/2014/main" id="{86950EA0-2A0D-2610-26D0-2008786F90B7}"/>
+                <a16:creationId xmlns:a16="http://schemas.microsoft.com/office/drawing/2014/main" id="{4DDD4022-C31F-4C4C-B5BF-5F9730C08A00}"/>
               </a:ext>
             </a:extLst>
           </p:cNvPr>
@@ -861,7 +916,7 @@
           <p:cNvPr id="4" name="Date Placeholder 3">
             <a:extLst>
               <a:ext uri="{FF2B5EF4-FFF2-40B4-BE49-F238E27FC236}">
-                <a16:creationId xmlns:a16="http://schemas.microsoft.com/office/drawing/2014/main" id="{4164D6DF-AAC2-6D6C-4917-C4476CE2C4E8}"/>
+                <a16:creationId xmlns:a16="http://schemas.microsoft.com/office/drawing/2014/main" id="{99A45EE9-11D3-436C-9D73-1AA6CCDB165F}"/>
               </a:ext>
             </a:extLst>
           </p:cNvPr>
@@ -877,9 +932,9 @@
           <a:bodyPr/>
           <a:lstStyle/>
           <a:p>
-            <a:fld id="{1A915F23-DF94-43E3-BA52-ADE72AAD8A76}" type="datetimeFigureOut">
+            <a:fld id="{2F3AF3C6-0FD4-4939-991C-00DDE5C56815}" type="datetime2">
               <a:rPr lang="en-US" smtClean="0"/>
-              <a:t>6/9/2022</a:t>
+              <a:t>Wednesday, December 7, 2022</a:t>
             </a:fld>
             <a:endParaRPr lang="en-US"/>
           </a:p>
@@ -890,7 +945,7 @@
           <p:cNvPr id="5" name="Footer Placeholder 4">
             <a:extLst>
               <a:ext uri="{FF2B5EF4-FFF2-40B4-BE49-F238E27FC236}">
-                <a16:creationId xmlns:a16="http://schemas.microsoft.com/office/drawing/2014/main" id="{38ED8D76-523A-1D50-00D0-506CB20111ED}"/>
+                <a16:creationId xmlns:a16="http://schemas.microsoft.com/office/drawing/2014/main" id="{92817DCF-881F-4956-81AE-A6D27A88F4B6}"/>
               </a:ext>
             </a:extLst>
           </p:cNvPr>
@@ -915,7 +970,7 @@
           <p:cNvPr id="6" name="Slide Number Placeholder 5">
             <a:extLst>
               <a:ext uri="{FF2B5EF4-FFF2-40B4-BE49-F238E27FC236}">
-                <a16:creationId xmlns:a16="http://schemas.microsoft.com/office/drawing/2014/main" id="{B4E88FCB-EAF1-98F8-EE2C-C2DE83F85967}"/>
+                <a16:creationId xmlns:a16="http://schemas.microsoft.com/office/drawing/2014/main" id="{0A265F17-AD75-4B7E-970D-5D4DBD5D170C}"/>
               </a:ext>
             </a:extLst>
           </p:cNvPr>
@@ -931,7 +986,7 @@
           <a:bodyPr/>
           <a:lstStyle/>
           <a:p>
-            <a:fld id="{068A6475-90B2-4FBC-9E20-58D309396431}" type="slidenum">
+            <a:fld id="{C01389E6-C847-4AD0-B56D-D205B2EAB1EE}" type="slidenum">
               <a:rPr lang="en-US" smtClean="0"/>
               <a:t>‹#›</a:t>
             </a:fld>
@@ -942,13 +997,25 @@
     </p:spTree>
     <p:extLst>
       <p:ext uri="{BB962C8B-B14F-4D97-AF65-F5344CB8AC3E}">
-        <p14:creationId xmlns:p14="http://schemas.microsoft.com/office/powerpoint/2010/main" val="86091678"/>
+        <p14:creationId xmlns:p14="http://schemas.microsoft.com/office/powerpoint/2010/main" val="1850779692"/>
       </p:ext>
     </p:extLst>
   </p:cSld>
   <p:clrMapOvr>
     <a:masterClrMapping/>
   </p:clrMapOvr>
+  <mc:AlternateContent xmlns:mc="http://schemas.openxmlformats.org/markup-compatibility/2006" xmlns:p14="http://schemas.microsoft.com/office/powerpoint/2010/main">
+    <mc:Choice Requires="p14">
+      <p:transition spd="slow" p14:dur="1500">
+        <p:split orient="vert"/>
+      </p:transition>
+    </mc:Choice>
+    <mc:Fallback xmlns="">
+      <p:transition spd="slow">
+        <p:split orient="vert"/>
+      </p:transition>
+    </mc:Fallback>
+  </mc:AlternateContent>
 </p:sldLayout>
 </file>
 
@@ -974,7 +1041,7 @@
           <p:cNvPr id="2" name="Title 1">
             <a:extLst>
               <a:ext uri="{FF2B5EF4-FFF2-40B4-BE49-F238E27FC236}">
-                <a16:creationId xmlns:a16="http://schemas.microsoft.com/office/drawing/2014/main" id="{B838619F-280F-A35F-6212-D87EF9AC44C0}"/>
+                <a16:creationId xmlns:a16="http://schemas.microsoft.com/office/drawing/2014/main" id="{A98C12CB-05D8-4D62-BDC5-812DB6DD04CD}"/>
               </a:ext>
             </a:extLst>
           </p:cNvPr>
@@ -987,15 +1054,20 @@
         </p:nvSpPr>
         <p:spPr>
           <a:xfrm>
-            <a:off x="831850" y="1709738"/>
-            <a:ext cx="10515600" cy="2852737"/>
+            <a:off x="1371600" y="1709738"/>
+            <a:ext cx="9966960" cy="2852737"/>
           </a:xfrm>
         </p:spPr>
         <p:txBody>
-          <a:bodyPr anchor="b"/>
+          <a:bodyPr anchor="b">
+            <a:normAutofit/>
+          </a:bodyPr>
           <a:lstStyle>
             <a:lvl1pPr>
-              <a:defRPr sz="6000"/>
+              <a:lnSpc>
+                <a:spcPct val="100000"/>
+              </a:lnSpc>
+              <a:defRPr sz="4400" spc="750" baseline="0"/>
             </a:lvl1pPr>
           </a:lstStyle>
           <a:p>
@@ -1003,6 +1075,7 @@
               <a:rPr lang="en-US"/>
               <a:t>Click to edit Master title style</a:t>
             </a:r>
+            <a:endParaRPr lang="en-US" dirty="0"/>
           </a:p>
         </p:txBody>
       </p:sp>
@@ -1011,7 +1084,7 @@
           <p:cNvPr id="3" name="Text Placeholder 2">
             <a:extLst>
               <a:ext uri="{FF2B5EF4-FFF2-40B4-BE49-F238E27FC236}">
-                <a16:creationId xmlns:a16="http://schemas.microsoft.com/office/drawing/2014/main" id="{89372E6C-245E-8444-0C0A-E95C21A25862}"/>
+                <a16:creationId xmlns:a16="http://schemas.microsoft.com/office/drawing/2014/main" id="{7C52F020-8516-4B9E-B455-5731ED6C9E9E}"/>
               </a:ext>
             </a:extLst>
           </p:cNvPr>
@@ -1024,20 +1097,20 @@
         </p:nvSpPr>
         <p:spPr>
           <a:xfrm>
-            <a:off x="831850" y="4589463"/>
-            <a:ext cx="10515600" cy="1500187"/>
+            <a:off x="1371600" y="4974336"/>
+            <a:ext cx="9966961" cy="1115568"/>
           </a:xfrm>
         </p:spPr>
         <p:txBody>
-          <a:bodyPr/>
+          <a:bodyPr>
+            <a:normAutofit/>
+          </a:bodyPr>
           <a:lstStyle>
             <a:lvl1pPr marL="0" indent="0">
               <a:buNone/>
-              <a:defRPr sz="2400">
+              <a:defRPr sz="1600" cap="all" spc="600" baseline="0">
                 <a:solidFill>
-                  <a:schemeClr val="tx1">
-                    <a:tint val="75000"/>
-                  </a:schemeClr>
+                  <a:schemeClr val="tx1"/>
                 </a:solidFill>
               </a:defRPr>
             </a:lvl1pPr>
@@ -1136,7 +1209,7 @@
           <p:cNvPr id="4" name="Date Placeholder 3">
             <a:extLst>
               <a:ext uri="{FF2B5EF4-FFF2-40B4-BE49-F238E27FC236}">
-                <a16:creationId xmlns:a16="http://schemas.microsoft.com/office/drawing/2014/main" id="{25D38CA4-1ADC-0B6E-1A4D-6F580F7D4FE0}"/>
+                <a16:creationId xmlns:a16="http://schemas.microsoft.com/office/drawing/2014/main" id="{7C822993-6E28-44BB-B983-095B476B801A}"/>
               </a:ext>
             </a:extLst>
           </p:cNvPr>
@@ -1152,9 +1225,9 @@
           <a:bodyPr/>
           <a:lstStyle/>
           <a:p>
-            <a:fld id="{1A915F23-DF94-43E3-BA52-ADE72AAD8A76}" type="datetimeFigureOut">
+            <a:fld id="{86807482-8128-47C6-A8DD-6452B0291CFF}" type="datetime2">
               <a:rPr lang="en-US" smtClean="0"/>
-              <a:t>6/9/2022</a:t>
+              <a:t>Wednesday, December 7, 2022</a:t>
             </a:fld>
             <a:endParaRPr lang="en-US"/>
           </a:p>
@@ -1165,7 +1238,7 @@
           <p:cNvPr id="5" name="Footer Placeholder 4">
             <a:extLst>
               <a:ext uri="{FF2B5EF4-FFF2-40B4-BE49-F238E27FC236}">
-                <a16:creationId xmlns:a16="http://schemas.microsoft.com/office/drawing/2014/main" id="{609FA55B-2F39-F7C8-DC65-0559837EDB9C}"/>
+                <a16:creationId xmlns:a16="http://schemas.microsoft.com/office/drawing/2014/main" id="{FC909971-06C9-462B-81D9-BEF24C708A1C}"/>
               </a:ext>
             </a:extLst>
           </p:cNvPr>
@@ -1190,7 +1263,7 @@
           <p:cNvPr id="6" name="Slide Number Placeholder 5">
             <a:extLst>
               <a:ext uri="{FF2B5EF4-FFF2-40B4-BE49-F238E27FC236}">
-                <a16:creationId xmlns:a16="http://schemas.microsoft.com/office/drawing/2014/main" id="{323266AD-3E10-8B9C-E899-1858192B55E0}"/>
+                <a16:creationId xmlns:a16="http://schemas.microsoft.com/office/drawing/2014/main" id="{CF9A076D-47C1-49CD-9A8B-956DB3FC31F7}"/>
               </a:ext>
             </a:extLst>
           </p:cNvPr>
@@ -1206,7 +1279,7 @@
           <a:bodyPr/>
           <a:lstStyle/>
           <a:p>
-            <a:fld id="{068A6475-90B2-4FBC-9E20-58D309396431}" type="slidenum">
+            <a:fld id="{C01389E6-C847-4AD0-B56D-D205B2EAB1EE}" type="slidenum">
               <a:rPr lang="en-US" smtClean="0"/>
               <a:t>‹#›</a:t>
             </a:fld>
@@ -1217,13 +1290,25 @@
     </p:spTree>
     <p:extLst>
       <p:ext uri="{BB962C8B-B14F-4D97-AF65-F5344CB8AC3E}">
-        <p14:creationId xmlns:p14="http://schemas.microsoft.com/office/powerpoint/2010/main" val="462739280"/>
+        <p14:creationId xmlns:p14="http://schemas.microsoft.com/office/powerpoint/2010/main" val="2216283195"/>
       </p:ext>
     </p:extLst>
   </p:cSld>
   <p:clrMapOvr>
     <a:masterClrMapping/>
   </p:clrMapOvr>
+  <mc:AlternateContent xmlns:mc="http://schemas.openxmlformats.org/markup-compatibility/2006" xmlns:p14="http://schemas.microsoft.com/office/powerpoint/2010/main">
+    <mc:Choice Requires="p14">
+      <p:transition spd="slow" p14:dur="1500">
+        <p:split orient="vert"/>
+      </p:transition>
+    </mc:Choice>
+    <mc:Fallback xmlns="">
+      <p:transition spd="slow">
+        <p:split orient="vert"/>
+      </p:transition>
+    </mc:Fallback>
+  </mc:AlternateContent>
 </p:sldLayout>
 </file>
 
@@ -1249,7 +1334,7 @@
           <p:cNvPr id="2" name="Title 1">
             <a:extLst>
               <a:ext uri="{FF2B5EF4-FFF2-40B4-BE49-F238E27FC236}">
-                <a16:creationId xmlns:a16="http://schemas.microsoft.com/office/drawing/2014/main" id="{FD839987-1449-BDCF-3C31-49A8D3D639DC}"/>
+                <a16:creationId xmlns:a16="http://schemas.microsoft.com/office/drawing/2014/main" id="{A428DFBD-F5ED-455C-8AD0-97476A55E3D5}"/>
               </a:ext>
             </a:extLst>
           </p:cNvPr>
@@ -1269,6 +1354,7 @@
               <a:rPr lang="en-US"/>
               <a:t>Click to edit Master title style</a:t>
             </a:r>
+            <a:endParaRPr lang="en-US" dirty="0"/>
           </a:p>
         </p:txBody>
       </p:sp>
@@ -1277,7 +1363,7 @@
           <p:cNvPr id="3" name="Content Placeholder 2">
             <a:extLst>
               <a:ext uri="{FF2B5EF4-FFF2-40B4-BE49-F238E27FC236}">
-                <a16:creationId xmlns:a16="http://schemas.microsoft.com/office/drawing/2014/main" id="{F18FE939-1318-4C80-1184-6088B9145A0E}"/>
+                <a16:creationId xmlns:a16="http://schemas.microsoft.com/office/drawing/2014/main" id="{8C30E58C-F463-4D52-9225-9410133113A4}"/>
               </a:ext>
             </a:extLst>
           </p:cNvPr>
@@ -1290,8 +1376,8 @@
         </p:nvSpPr>
         <p:spPr>
           <a:xfrm>
-            <a:off x="838200" y="1825625"/>
-            <a:ext cx="5181600" cy="4351338"/>
+            <a:off x="1371600" y="2112264"/>
+            <a:ext cx="4846320" cy="3959352"/>
           </a:xfrm>
         </p:spPr>
         <p:txBody>
@@ -1331,6 +1417,7 @@
               <a:rPr lang="en-US"/>
               <a:t>Fifth level</a:t>
             </a:r>
+            <a:endParaRPr lang="en-US" dirty="0"/>
           </a:p>
         </p:txBody>
       </p:sp>
@@ -1339,7 +1426,7 @@
           <p:cNvPr id="4" name="Content Placeholder 3">
             <a:extLst>
               <a:ext uri="{FF2B5EF4-FFF2-40B4-BE49-F238E27FC236}">
-                <a16:creationId xmlns:a16="http://schemas.microsoft.com/office/drawing/2014/main" id="{5393A66F-2C3F-E6CC-1862-3B09BB2F0A66}"/>
+                <a16:creationId xmlns:a16="http://schemas.microsoft.com/office/drawing/2014/main" id="{6AF7BDB4-97FA-485D-A557-6F96692BAC9E}"/>
               </a:ext>
             </a:extLst>
           </p:cNvPr>
@@ -1352,8 +1439,8 @@
         </p:nvSpPr>
         <p:spPr>
           <a:xfrm>
-            <a:off x="6172200" y="1825625"/>
-            <a:ext cx="5181600" cy="4351338"/>
+            <a:off x="6766560" y="2112265"/>
+            <a:ext cx="4846320" cy="3959351"/>
           </a:xfrm>
         </p:spPr>
         <p:txBody>
@@ -1393,6 +1480,7 @@
               <a:rPr lang="en-US"/>
               <a:t>Fifth level</a:t>
             </a:r>
+            <a:endParaRPr lang="en-US" dirty="0"/>
           </a:p>
         </p:txBody>
       </p:sp>
@@ -1401,7 +1489,7 @@
           <p:cNvPr id="5" name="Date Placeholder 4">
             <a:extLst>
               <a:ext uri="{FF2B5EF4-FFF2-40B4-BE49-F238E27FC236}">
-                <a16:creationId xmlns:a16="http://schemas.microsoft.com/office/drawing/2014/main" id="{E3DB0A53-5C08-53BA-F32A-35E7A1688398}"/>
+                <a16:creationId xmlns:a16="http://schemas.microsoft.com/office/drawing/2014/main" id="{68C50007-C799-4117-8ACD-5EE980E63F17}"/>
               </a:ext>
             </a:extLst>
           </p:cNvPr>
@@ -1417,9 +1505,9 @@
           <a:bodyPr/>
           <a:lstStyle/>
           <a:p>
-            <a:fld id="{1A915F23-DF94-43E3-BA52-ADE72AAD8A76}" type="datetimeFigureOut">
+            <a:fld id="{37903F25-275E-41DE-BE3B-EBF0DB49F9B1}" type="datetime2">
               <a:rPr lang="en-US" smtClean="0"/>
-              <a:t>6/9/2022</a:t>
+              <a:t>Wednesday, December 7, 2022</a:t>
             </a:fld>
             <a:endParaRPr lang="en-US"/>
           </a:p>
@@ -1430,7 +1518,7 @@
           <p:cNvPr id="6" name="Footer Placeholder 5">
             <a:extLst>
               <a:ext uri="{FF2B5EF4-FFF2-40B4-BE49-F238E27FC236}">
-                <a16:creationId xmlns:a16="http://schemas.microsoft.com/office/drawing/2014/main" id="{C28AF982-5022-5B30-187C-CDDBF8266289}"/>
+                <a16:creationId xmlns:a16="http://schemas.microsoft.com/office/drawing/2014/main" id="{F24E8968-6BAD-4D5A-BF1D-911C7A39C1CE}"/>
               </a:ext>
             </a:extLst>
           </p:cNvPr>
@@ -1455,7 +1543,7 @@
           <p:cNvPr id="7" name="Slide Number Placeholder 6">
             <a:extLst>
               <a:ext uri="{FF2B5EF4-FFF2-40B4-BE49-F238E27FC236}">
-                <a16:creationId xmlns:a16="http://schemas.microsoft.com/office/drawing/2014/main" id="{C582B9B3-D57B-C611-4042-E4BB618A0825}"/>
+                <a16:creationId xmlns:a16="http://schemas.microsoft.com/office/drawing/2014/main" id="{499D8C08-BF20-4D5E-9004-0C075C36D8A4}"/>
               </a:ext>
             </a:extLst>
           </p:cNvPr>
@@ -1471,7 +1559,7 @@
           <a:bodyPr/>
           <a:lstStyle/>
           <a:p>
-            <a:fld id="{068A6475-90B2-4FBC-9E20-58D309396431}" type="slidenum">
+            <a:fld id="{C01389E6-C847-4AD0-B56D-D205B2EAB1EE}" type="slidenum">
               <a:rPr lang="en-US" smtClean="0"/>
               <a:t>‹#›</a:t>
             </a:fld>
@@ -1482,18 +1570,30 @@
     </p:spTree>
     <p:extLst>
       <p:ext uri="{BB962C8B-B14F-4D97-AF65-F5344CB8AC3E}">
-        <p14:creationId xmlns:p14="http://schemas.microsoft.com/office/powerpoint/2010/main" val="2317130101"/>
+        <p14:creationId xmlns:p14="http://schemas.microsoft.com/office/powerpoint/2010/main" val="2254152918"/>
       </p:ext>
     </p:extLst>
   </p:cSld>
   <p:clrMapOvr>
     <a:masterClrMapping/>
   </p:clrMapOvr>
+  <mc:AlternateContent xmlns:mc="http://schemas.openxmlformats.org/markup-compatibility/2006" xmlns:p14="http://schemas.microsoft.com/office/powerpoint/2010/main">
+    <mc:Choice Requires="p14">
+      <p:transition spd="slow" p14:dur="1500">
+        <p:split orient="vert"/>
+      </p:transition>
+    </mc:Choice>
+    <mc:Fallback xmlns="">
+      <p:transition spd="slow">
+        <p:split orient="vert"/>
+      </p:transition>
+    </mc:Fallback>
+  </mc:AlternateContent>
 </p:sldLayout>
 </file>
 
 <file path=ppt/slideLayouts/slideLayout5.xml><?xml version="1.0" encoding="utf-8"?>
-<p:sldLayout xmlns:a="http://schemas.openxmlformats.org/drawingml/2006/main" xmlns:r="http://schemas.openxmlformats.org/officeDocument/2006/relationships" xmlns:p="http://schemas.openxmlformats.org/presentationml/2006/main" type="twoTxTwoObj" preserve="1">
+<p:sldLayout xmlns:a="http://schemas.openxmlformats.org/drawingml/2006/main" xmlns:r="http://schemas.openxmlformats.org/officeDocument/2006/relationships" xmlns:p="http://schemas.openxmlformats.org/presentationml/2006/main" preserve="1">
   <p:cSld name="Comparison">
     <p:spTree>
       <p:nvGrpSpPr>
@@ -1511,57 +1611,24 @@
       </p:grpSpPr>
       <p:sp>
         <p:nvSpPr>
-          <p:cNvPr id="2" name="Title 1">
-            <a:extLst>
-              <a:ext uri="{FF2B5EF4-FFF2-40B4-BE49-F238E27FC236}">
-                <a16:creationId xmlns:a16="http://schemas.microsoft.com/office/drawing/2014/main" id="{BAB4676A-4AAC-8905-3C76-738E1626A067}"/>
-              </a:ext>
-            </a:extLst>
-          </p:cNvPr>
-          <p:cNvSpPr>
-            <a:spLocks noGrp="1"/>
-          </p:cNvSpPr>
-          <p:nvPr>
-            <p:ph type="title"/>
+          <p:cNvPr id="3" name="Text Placeholder 2">
+            <a:extLst>
+              <a:ext uri="{FF2B5EF4-FFF2-40B4-BE49-F238E27FC236}">
+                <a16:creationId xmlns:a16="http://schemas.microsoft.com/office/drawing/2014/main" id="{82036E0D-26A5-455A-A8BD-70DA8BC03EB2}"/>
+              </a:ext>
+            </a:extLst>
+          </p:cNvPr>
+          <p:cNvSpPr>
+            <a:spLocks noGrp="1"/>
+          </p:cNvSpPr>
+          <p:nvPr>
+            <p:ph type="body" idx="1"/>
           </p:nvPr>
         </p:nvSpPr>
         <p:spPr>
           <a:xfrm>
-            <a:off x="839788" y="365125"/>
-            <a:ext cx="10515600" cy="1325563"/>
-          </a:xfrm>
-        </p:spPr>
-        <p:txBody>
-          <a:bodyPr/>
-          <a:lstStyle/>
-          <a:p>
-            <a:r>
-              <a:rPr lang="en-US"/>
-              <a:t>Click to edit Master title style</a:t>
-            </a:r>
-          </a:p>
-        </p:txBody>
-      </p:sp>
-      <p:sp>
-        <p:nvSpPr>
-          <p:cNvPr id="3" name="Text Placeholder 2">
-            <a:extLst>
-              <a:ext uri="{FF2B5EF4-FFF2-40B4-BE49-F238E27FC236}">
-                <a16:creationId xmlns:a16="http://schemas.microsoft.com/office/drawing/2014/main" id="{7D132172-D238-14A0-3E3E-6498C89B8867}"/>
-              </a:ext>
-            </a:extLst>
-          </p:cNvPr>
-          <p:cNvSpPr>
-            <a:spLocks noGrp="1"/>
-          </p:cNvSpPr>
-          <p:nvPr>
-            <p:ph type="body" idx="1"/>
-          </p:nvPr>
-        </p:nvSpPr>
-        <p:spPr>
-          <a:xfrm>
-            <a:off x="839788" y="1681163"/>
-            <a:ext cx="5157787" cy="823912"/>
+            <a:off x="1371600" y="2112264"/>
+            <a:ext cx="4841076" cy="823912"/>
           </a:xfrm>
         </p:spPr>
         <p:txBody>
@@ -1618,7 +1685,7 @@
           <p:cNvPr id="4" name="Content Placeholder 3">
             <a:extLst>
               <a:ext uri="{FF2B5EF4-FFF2-40B4-BE49-F238E27FC236}">
-                <a16:creationId xmlns:a16="http://schemas.microsoft.com/office/drawing/2014/main" id="{963D9D4F-0548-9354-6BB4-877322A9CDB8}"/>
+                <a16:creationId xmlns:a16="http://schemas.microsoft.com/office/drawing/2014/main" id="{E7FD4EA0-094D-4056-9032-BFB44B40896B}"/>
               </a:ext>
             </a:extLst>
           </p:cNvPr>
@@ -1631,8 +1698,8 @@
         </p:nvSpPr>
         <p:spPr>
           <a:xfrm>
-            <a:off x="839788" y="2505075"/>
-            <a:ext cx="5157787" cy="3684588"/>
+            <a:off x="1371600" y="3018472"/>
+            <a:ext cx="4841076" cy="3104856"/>
           </a:xfrm>
         </p:spPr>
         <p:txBody>
@@ -1672,6 +1739,7 @@
               <a:rPr lang="en-US"/>
               <a:t>Fifth level</a:t>
             </a:r>
+            <a:endParaRPr lang="en-US" dirty="0"/>
           </a:p>
         </p:txBody>
       </p:sp>
@@ -1680,7 +1748,7 @@
           <p:cNvPr id="5" name="Text Placeholder 4">
             <a:extLst>
               <a:ext uri="{FF2B5EF4-FFF2-40B4-BE49-F238E27FC236}">
-                <a16:creationId xmlns:a16="http://schemas.microsoft.com/office/drawing/2014/main" id="{7DEC45E7-E4DE-7D8B-2441-C801189EAA7F}"/>
+                <a16:creationId xmlns:a16="http://schemas.microsoft.com/office/drawing/2014/main" id="{5FC0CCE8-718F-4620-8B4A-C60EEA7B884D}"/>
               </a:ext>
             </a:extLst>
           </p:cNvPr>
@@ -1693,8 +1761,8 @@
         </p:nvSpPr>
         <p:spPr>
           <a:xfrm>
-            <a:off x="6172200" y="1681163"/>
-            <a:ext cx="5183188" cy="823912"/>
+            <a:off x="6766560" y="2112264"/>
+            <a:ext cx="4846320" cy="823912"/>
           </a:xfrm>
         </p:spPr>
         <p:txBody>
@@ -1751,7 +1819,7 @@
           <p:cNvPr id="6" name="Content Placeholder 5">
             <a:extLst>
               <a:ext uri="{FF2B5EF4-FFF2-40B4-BE49-F238E27FC236}">
-                <a16:creationId xmlns:a16="http://schemas.microsoft.com/office/drawing/2014/main" id="{68969169-DF15-46DA-6270-EB43E340C912}"/>
+                <a16:creationId xmlns:a16="http://schemas.microsoft.com/office/drawing/2014/main" id="{56CE86DF-0069-4D31-BDD3-A9A2F9B7B468}"/>
               </a:ext>
             </a:extLst>
           </p:cNvPr>
@@ -1764,8 +1832,8 @@
         </p:nvSpPr>
         <p:spPr>
           <a:xfrm>
-            <a:off x="6172200" y="2505075"/>
-            <a:ext cx="5183188" cy="3684588"/>
+            <a:off x="6766560" y="3018471"/>
+            <a:ext cx="4841076" cy="3104857"/>
           </a:xfrm>
         </p:spPr>
         <p:txBody>
@@ -1805,6 +1873,7 @@
               <a:rPr lang="en-US"/>
               <a:t>Fifth level</a:t>
             </a:r>
+            <a:endParaRPr lang="en-US" dirty="0"/>
           </a:p>
         </p:txBody>
       </p:sp>
@@ -1813,7 +1882,7 @@
           <p:cNvPr id="7" name="Date Placeholder 6">
             <a:extLst>
               <a:ext uri="{FF2B5EF4-FFF2-40B4-BE49-F238E27FC236}">
-                <a16:creationId xmlns:a16="http://schemas.microsoft.com/office/drawing/2014/main" id="{05096250-A58A-648F-12EA-7F8338C03D84}"/>
+                <a16:creationId xmlns:a16="http://schemas.microsoft.com/office/drawing/2014/main" id="{21A5ED06-FE54-4B86-A8D4-07D0EB08C3AB}"/>
               </a:ext>
             </a:extLst>
           </p:cNvPr>
@@ -1829,9 +1898,9 @@
           <a:bodyPr/>
           <a:lstStyle/>
           <a:p>
-            <a:fld id="{1A915F23-DF94-43E3-BA52-ADE72AAD8A76}" type="datetimeFigureOut">
+            <a:fld id="{EE475572-4A44-4171-84AA-64D42C8050A6}" type="datetime2">
               <a:rPr lang="en-US" smtClean="0"/>
-              <a:t>6/9/2022</a:t>
+              <a:t>Wednesday, December 7, 2022</a:t>
             </a:fld>
             <a:endParaRPr lang="en-US"/>
           </a:p>
@@ -1842,7 +1911,7 @@
           <p:cNvPr id="8" name="Footer Placeholder 7">
             <a:extLst>
               <a:ext uri="{FF2B5EF4-FFF2-40B4-BE49-F238E27FC236}">
-                <a16:creationId xmlns:a16="http://schemas.microsoft.com/office/drawing/2014/main" id="{31EF92F2-2BC9-EA35-0E91-C6FD7F9B1B6E}"/>
+                <a16:creationId xmlns:a16="http://schemas.microsoft.com/office/drawing/2014/main" id="{CE9EC6C3-0950-4AFE-936A-9AB5D227844D}"/>
               </a:ext>
             </a:extLst>
           </p:cNvPr>
@@ -1867,7 +1936,7 @@
           <p:cNvPr id="9" name="Slide Number Placeholder 8">
             <a:extLst>
               <a:ext uri="{FF2B5EF4-FFF2-40B4-BE49-F238E27FC236}">
-                <a16:creationId xmlns:a16="http://schemas.microsoft.com/office/drawing/2014/main" id="{F4288BDA-F2D2-5A00-CF2A-E00949AF5F81}"/>
+                <a16:creationId xmlns:a16="http://schemas.microsoft.com/office/drawing/2014/main" id="{6784B1D1-BE0C-48F4-BC74-90675A0F07CF}"/>
               </a:ext>
             </a:extLst>
           </p:cNvPr>
@@ -1883,7 +1952,7 @@
           <a:bodyPr/>
           <a:lstStyle/>
           <a:p>
-            <a:fld id="{068A6475-90B2-4FBC-9E20-58D309396431}" type="slidenum">
+            <a:fld id="{C01389E6-C847-4AD0-B56D-D205B2EAB1EE}" type="slidenum">
               <a:rPr lang="en-US" smtClean="0"/>
               <a:t>‹#›</a:t>
             </a:fld>
@@ -1891,16 +1960,57 @@
           </a:p>
         </p:txBody>
       </p:sp>
+      <p:sp>
+        <p:nvSpPr>
+          <p:cNvPr id="10" name="Title 9">
+            <a:extLst>
+              <a:ext uri="{FF2B5EF4-FFF2-40B4-BE49-F238E27FC236}">
+                <a16:creationId xmlns:a16="http://schemas.microsoft.com/office/drawing/2014/main" id="{2D453288-3D76-40C1-BE00-223AB28F13DF}"/>
+              </a:ext>
+            </a:extLst>
+          </p:cNvPr>
+          <p:cNvSpPr>
+            <a:spLocks noGrp="1"/>
+          </p:cNvSpPr>
+          <p:nvPr>
+            <p:ph type="title"/>
+          </p:nvPr>
+        </p:nvSpPr>
+        <p:spPr/>
+        <p:txBody>
+          <a:bodyPr/>
+          <a:lstStyle/>
+          <a:p>
+            <a:r>
+              <a:rPr lang="en-US"/>
+              <a:t>Click to edit Master title style</a:t>
+            </a:r>
+            <a:endParaRPr lang="en-US" dirty="0"/>
+          </a:p>
+        </p:txBody>
+      </p:sp>
     </p:spTree>
     <p:extLst>
       <p:ext uri="{BB962C8B-B14F-4D97-AF65-F5344CB8AC3E}">
-        <p14:creationId xmlns:p14="http://schemas.microsoft.com/office/powerpoint/2010/main" val="885320073"/>
+        <p14:creationId xmlns:p14="http://schemas.microsoft.com/office/powerpoint/2010/main" val="643143354"/>
       </p:ext>
     </p:extLst>
   </p:cSld>
   <p:clrMapOvr>
     <a:masterClrMapping/>
   </p:clrMapOvr>
+  <mc:AlternateContent xmlns:mc="http://schemas.openxmlformats.org/markup-compatibility/2006" xmlns:p14="http://schemas.microsoft.com/office/powerpoint/2010/main">
+    <mc:Choice Requires="p14">
+      <p:transition spd="slow" p14:dur="1500">
+        <p:split orient="vert"/>
+      </p:transition>
+    </mc:Choice>
+    <mc:Fallback xmlns="">
+      <p:transition spd="slow">
+        <p:split orient="vert"/>
+      </p:transition>
+    </mc:Fallback>
+  </mc:AlternateContent>
 </p:sldLayout>
 </file>
 
@@ -1926,7 +2036,7 @@
           <p:cNvPr id="2" name="Title 1">
             <a:extLst>
               <a:ext uri="{FF2B5EF4-FFF2-40B4-BE49-F238E27FC236}">
-                <a16:creationId xmlns:a16="http://schemas.microsoft.com/office/drawing/2014/main" id="{58287A51-4617-2884-396B-428F0FFCE406}"/>
+                <a16:creationId xmlns:a16="http://schemas.microsoft.com/office/drawing/2014/main" id="{003B1716-24B0-42CD-95B6-843092597B29}"/>
               </a:ext>
             </a:extLst>
           </p:cNvPr>
@@ -1954,7 +2064,7 @@
           <p:cNvPr id="3" name="Date Placeholder 2">
             <a:extLst>
               <a:ext uri="{FF2B5EF4-FFF2-40B4-BE49-F238E27FC236}">
-                <a16:creationId xmlns:a16="http://schemas.microsoft.com/office/drawing/2014/main" id="{FB8A0763-BDE7-EBEC-E200-19EE3CFA4925}"/>
+                <a16:creationId xmlns:a16="http://schemas.microsoft.com/office/drawing/2014/main" id="{F9E3617E-4B11-481F-AC6E-00031790294A}"/>
               </a:ext>
             </a:extLst>
           </p:cNvPr>
@@ -1970,9 +2080,9 @@
           <a:bodyPr/>
           <a:lstStyle/>
           <a:p>
-            <a:fld id="{1A915F23-DF94-43E3-BA52-ADE72AAD8A76}" type="datetimeFigureOut">
+            <a:fld id="{C4C1612E-528E-4FD5-9E9E-E15F1108F171}" type="datetime2">
               <a:rPr lang="en-US" smtClean="0"/>
-              <a:t>6/9/2022</a:t>
+              <a:t>Wednesday, December 7, 2022</a:t>
             </a:fld>
             <a:endParaRPr lang="en-US"/>
           </a:p>
@@ -1983,7 +2093,7 @@
           <p:cNvPr id="4" name="Footer Placeholder 3">
             <a:extLst>
               <a:ext uri="{FF2B5EF4-FFF2-40B4-BE49-F238E27FC236}">
-                <a16:creationId xmlns:a16="http://schemas.microsoft.com/office/drawing/2014/main" id="{7550E969-DAFB-7E88-DB52-569460A2E720}"/>
+                <a16:creationId xmlns:a16="http://schemas.microsoft.com/office/drawing/2014/main" id="{F6BF19CC-06D3-40E9-81B5-63B457B220CF}"/>
               </a:ext>
             </a:extLst>
           </p:cNvPr>
@@ -2008,7 +2118,7 @@
           <p:cNvPr id="5" name="Slide Number Placeholder 4">
             <a:extLst>
               <a:ext uri="{FF2B5EF4-FFF2-40B4-BE49-F238E27FC236}">
-                <a16:creationId xmlns:a16="http://schemas.microsoft.com/office/drawing/2014/main" id="{F0D293A6-117B-0232-D7A7-122EB10D2451}"/>
+                <a16:creationId xmlns:a16="http://schemas.microsoft.com/office/drawing/2014/main" id="{6AEFC312-3AA5-46F7-B701-3D9327A68DB7}"/>
               </a:ext>
             </a:extLst>
           </p:cNvPr>
@@ -2024,7 +2134,7 @@
           <a:bodyPr/>
           <a:lstStyle/>
           <a:p>
-            <a:fld id="{068A6475-90B2-4FBC-9E20-58D309396431}" type="slidenum">
+            <a:fld id="{C01389E6-C847-4AD0-B56D-D205B2EAB1EE}" type="slidenum">
               <a:rPr lang="en-US" smtClean="0"/>
               <a:t>‹#›</a:t>
             </a:fld>
@@ -2035,13 +2145,25 @@
     </p:spTree>
     <p:extLst>
       <p:ext uri="{BB962C8B-B14F-4D97-AF65-F5344CB8AC3E}">
-        <p14:creationId xmlns:p14="http://schemas.microsoft.com/office/powerpoint/2010/main" val="1352137562"/>
+        <p14:creationId xmlns:p14="http://schemas.microsoft.com/office/powerpoint/2010/main" val="802683705"/>
       </p:ext>
     </p:extLst>
   </p:cSld>
   <p:clrMapOvr>
     <a:masterClrMapping/>
   </p:clrMapOvr>
+  <mc:AlternateContent xmlns:mc="http://schemas.openxmlformats.org/markup-compatibility/2006" xmlns:p14="http://schemas.microsoft.com/office/powerpoint/2010/main">
+    <mc:Choice Requires="p14">
+      <p:transition spd="slow" p14:dur="1500">
+        <p:split orient="vert"/>
+      </p:transition>
+    </mc:Choice>
+    <mc:Fallback xmlns="">
+      <p:transition spd="slow">
+        <p:split orient="vert"/>
+      </p:transition>
+    </mc:Fallback>
+  </mc:AlternateContent>
 </p:sldLayout>
 </file>
 
@@ -2067,7 +2189,7 @@
           <p:cNvPr id="2" name="Date Placeholder 1">
             <a:extLst>
               <a:ext uri="{FF2B5EF4-FFF2-40B4-BE49-F238E27FC236}">
-                <a16:creationId xmlns:a16="http://schemas.microsoft.com/office/drawing/2014/main" id="{539CEE73-19C0-F4F7-EA9D-70A84BD8A4C9}"/>
+                <a16:creationId xmlns:a16="http://schemas.microsoft.com/office/drawing/2014/main" id="{B8C9E28E-1389-47AF-B3EB-22571417ACBE}"/>
               </a:ext>
             </a:extLst>
           </p:cNvPr>
@@ -2083,9 +2205,9 @@
           <a:bodyPr/>
           <a:lstStyle/>
           <a:p>
-            <a:fld id="{1A915F23-DF94-43E3-BA52-ADE72AAD8A76}" type="datetimeFigureOut">
+            <a:fld id="{D4F6D862-A06D-436F-A92E-EBAAD50B6E50}" type="datetime2">
               <a:rPr lang="en-US" smtClean="0"/>
-              <a:t>6/9/2022</a:t>
+              <a:t>Wednesday, December 7, 2022</a:t>
             </a:fld>
             <a:endParaRPr lang="en-US"/>
           </a:p>
@@ -2096,7 +2218,7 @@
           <p:cNvPr id="3" name="Footer Placeholder 2">
             <a:extLst>
               <a:ext uri="{FF2B5EF4-FFF2-40B4-BE49-F238E27FC236}">
-                <a16:creationId xmlns:a16="http://schemas.microsoft.com/office/drawing/2014/main" id="{A694A82F-2235-20E8-A5B5-F6D749C4270B}"/>
+                <a16:creationId xmlns:a16="http://schemas.microsoft.com/office/drawing/2014/main" id="{BFCF6B08-1984-4F7C-9F6E-A4F47BDBA215}"/>
               </a:ext>
             </a:extLst>
           </p:cNvPr>
@@ -2121,7 +2243,7 @@
           <p:cNvPr id="4" name="Slide Number Placeholder 3">
             <a:extLst>
               <a:ext uri="{FF2B5EF4-FFF2-40B4-BE49-F238E27FC236}">
-                <a16:creationId xmlns:a16="http://schemas.microsoft.com/office/drawing/2014/main" id="{A1197891-10B2-14BE-493F-979FDB1B6461}"/>
+                <a16:creationId xmlns:a16="http://schemas.microsoft.com/office/drawing/2014/main" id="{7771B3C5-CEC7-427F-931C-1318C421BEF9}"/>
               </a:ext>
             </a:extLst>
           </p:cNvPr>
@@ -2137,7 +2259,7 @@
           <a:bodyPr/>
           <a:lstStyle/>
           <a:p>
-            <a:fld id="{068A6475-90B2-4FBC-9E20-58D309396431}" type="slidenum">
+            <a:fld id="{C01389E6-C847-4AD0-B56D-D205B2EAB1EE}" type="slidenum">
               <a:rPr lang="en-US" smtClean="0"/>
               <a:t>‹#›</a:t>
             </a:fld>
@@ -2148,13 +2270,25 @@
     </p:spTree>
     <p:extLst>
       <p:ext uri="{BB962C8B-B14F-4D97-AF65-F5344CB8AC3E}">
-        <p14:creationId xmlns:p14="http://schemas.microsoft.com/office/powerpoint/2010/main" val="1121170392"/>
+        <p14:creationId xmlns:p14="http://schemas.microsoft.com/office/powerpoint/2010/main" val="333060071"/>
       </p:ext>
     </p:extLst>
   </p:cSld>
   <p:clrMapOvr>
     <a:masterClrMapping/>
   </p:clrMapOvr>
+  <mc:AlternateContent xmlns:mc="http://schemas.openxmlformats.org/markup-compatibility/2006" xmlns:p14="http://schemas.microsoft.com/office/powerpoint/2010/main">
+    <mc:Choice Requires="p14">
+      <p:transition spd="slow" p14:dur="1500">
+        <p:split orient="vert"/>
+      </p:transition>
+    </mc:Choice>
+    <mc:Fallback xmlns="">
+      <p:transition spd="slow">
+        <p:split orient="vert"/>
+      </p:transition>
+    </mc:Fallback>
+  </mc:AlternateContent>
 </p:sldLayout>
 </file>
 
@@ -2180,7 +2314,7 @@
           <p:cNvPr id="2" name="Title 1">
             <a:extLst>
               <a:ext uri="{FF2B5EF4-FFF2-40B4-BE49-F238E27FC236}">
-                <a16:creationId xmlns:a16="http://schemas.microsoft.com/office/drawing/2014/main" id="{98129C96-CD40-918A-7054-4FC5002BFDB1}"/>
+                <a16:creationId xmlns:a16="http://schemas.microsoft.com/office/drawing/2014/main" id="{EB4EB55F-536E-4547-A5D2-0483FC3684CD}"/>
               </a:ext>
             </a:extLst>
           </p:cNvPr>
@@ -2193,14 +2327,17 @@
         </p:nvSpPr>
         <p:spPr>
           <a:xfrm>
-            <a:off x="839788" y="457200"/>
-            <a:ext cx="3932237" cy="1600200"/>
+            <a:off x="1371600" y="987425"/>
+            <a:ext cx="3932237" cy="1894511"/>
           </a:xfrm>
         </p:spPr>
         <p:txBody>
           <a:bodyPr anchor="b"/>
           <a:lstStyle>
             <a:lvl1pPr>
+              <a:lnSpc>
+                <a:spcPct val="100000"/>
+              </a:lnSpc>
               <a:defRPr sz="3200"/>
             </a:lvl1pPr>
           </a:lstStyle>
@@ -2209,6 +2346,7 @@
               <a:rPr lang="en-US"/>
               <a:t>Click to edit Master title style</a:t>
             </a:r>
+            <a:endParaRPr lang="en-US" dirty="0"/>
           </a:p>
         </p:txBody>
       </p:sp>
@@ -2217,7 +2355,7 @@
           <p:cNvPr id="3" name="Content Placeholder 2">
             <a:extLst>
               <a:ext uri="{FF2B5EF4-FFF2-40B4-BE49-F238E27FC236}">
-                <a16:creationId xmlns:a16="http://schemas.microsoft.com/office/drawing/2014/main" id="{9993374E-5D8E-339A-C343-BE9B0104CB9C}"/>
+                <a16:creationId xmlns:a16="http://schemas.microsoft.com/office/drawing/2014/main" id="{3D717D3C-533B-4EA9-886B-FAE59956C74C}"/>
               </a:ext>
             </a:extLst>
           </p:cNvPr>
@@ -2230,27 +2368,29 @@
         </p:nvSpPr>
         <p:spPr>
           <a:xfrm>
-            <a:off x="5183188" y="987425"/>
-            <a:ext cx="6172200" cy="4873625"/>
+            <a:off x="5650992" y="987425"/>
+            <a:ext cx="5687568" cy="4873625"/>
           </a:xfrm>
         </p:spPr>
         <p:txBody>
-          <a:bodyPr/>
+          <a:bodyPr>
+            <a:normAutofit/>
+          </a:bodyPr>
           <a:lstStyle>
             <a:lvl1pPr>
-              <a:defRPr sz="3200"/>
+              <a:defRPr sz="2000"/>
             </a:lvl1pPr>
             <a:lvl2pPr>
-              <a:defRPr sz="2800"/>
+              <a:defRPr sz="2000"/>
             </a:lvl2pPr>
             <a:lvl3pPr>
-              <a:defRPr sz="2400"/>
+              <a:defRPr sz="1800"/>
             </a:lvl3pPr>
             <a:lvl4pPr>
-              <a:defRPr sz="2000"/>
+              <a:defRPr sz="1600"/>
             </a:lvl4pPr>
             <a:lvl5pPr>
-              <a:defRPr sz="2000"/>
+              <a:defRPr sz="1600"/>
             </a:lvl5pPr>
             <a:lvl6pPr>
               <a:defRPr sz="2000"/>
@@ -2268,35 +2408,35 @@
           <a:p>
             <a:pPr lvl="0"/>
             <a:r>
-              <a:rPr lang="en-US"/>
+              <a:rPr lang="en-US" dirty="0"/>
               <a:t>Click to edit Master text styles</a:t>
             </a:r>
           </a:p>
           <a:p>
             <a:pPr lvl="1"/>
             <a:r>
-              <a:rPr lang="en-US"/>
+              <a:rPr lang="en-US" dirty="0"/>
               <a:t>Second level</a:t>
             </a:r>
           </a:p>
           <a:p>
             <a:pPr lvl="2"/>
             <a:r>
-              <a:rPr lang="en-US"/>
+              <a:rPr lang="en-US" dirty="0"/>
               <a:t>Third level</a:t>
             </a:r>
           </a:p>
           <a:p>
             <a:pPr lvl="3"/>
             <a:r>
-              <a:rPr lang="en-US"/>
+              <a:rPr lang="en-US" dirty="0"/>
               <a:t>Fourth level</a:t>
             </a:r>
           </a:p>
           <a:p>
             <a:pPr lvl="4"/>
             <a:r>
-              <a:rPr lang="en-US"/>
+              <a:rPr lang="en-US" dirty="0"/>
               <a:t>Fifth level</a:t>
             </a:r>
           </a:p>
@@ -2307,7 +2447,7 @@
           <p:cNvPr id="4" name="Text Placeholder 3">
             <a:extLst>
               <a:ext uri="{FF2B5EF4-FFF2-40B4-BE49-F238E27FC236}">
-                <a16:creationId xmlns:a16="http://schemas.microsoft.com/office/drawing/2014/main" id="{23767898-9EE1-1B25-CEB2-B5E0E7B86938}"/>
+                <a16:creationId xmlns:a16="http://schemas.microsoft.com/office/drawing/2014/main" id="{2419D2E1-4B17-4608-961E-2C4719855E89}"/>
               </a:ext>
             </a:extLst>
           </p:cNvPr>
@@ -2320,8 +2460,8 @@
         </p:nvSpPr>
         <p:spPr>
           <a:xfrm>
-            <a:off x="839788" y="2057400"/>
-            <a:ext cx="3932237" cy="3811588"/>
+            <a:off x="1371600" y="3058510"/>
+            <a:ext cx="3932237" cy="2802540"/>
           </a:xfrm>
         </p:spPr>
         <p:txBody>
@@ -2378,7 +2518,7 @@
           <p:cNvPr id="5" name="Date Placeholder 4">
             <a:extLst>
               <a:ext uri="{FF2B5EF4-FFF2-40B4-BE49-F238E27FC236}">
-                <a16:creationId xmlns:a16="http://schemas.microsoft.com/office/drawing/2014/main" id="{9CEAD73A-1BC8-37F7-1C82-247C6A39E49C}"/>
+                <a16:creationId xmlns:a16="http://schemas.microsoft.com/office/drawing/2014/main" id="{B75A3535-184C-438C-AE91-9C42B7C5AFB6}"/>
               </a:ext>
             </a:extLst>
           </p:cNvPr>
@@ -2394,9 +2534,9 @@
           <a:bodyPr/>
           <a:lstStyle/>
           <a:p>
-            <a:fld id="{1A915F23-DF94-43E3-BA52-ADE72AAD8A76}" type="datetimeFigureOut">
+            <a:fld id="{B73E0B7D-2260-4809-8F0A-9E5F3E24F169}" type="datetime2">
               <a:rPr lang="en-US" smtClean="0"/>
-              <a:t>6/9/2022</a:t>
+              <a:t>Wednesday, December 7, 2022</a:t>
             </a:fld>
             <a:endParaRPr lang="en-US"/>
           </a:p>
@@ -2407,7 +2547,7 @@
           <p:cNvPr id="6" name="Footer Placeholder 5">
             <a:extLst>
               <a:ext uri="{FF2B5EF4-FFF2-40B4-BE49-F238E27FC236}">
-                <a16:creationId xmlns:a16="http://schemas.microsoft.com/office/drawing/2014/main" id="{49DCA828-4764-051D-5B9B-04E9C9F1DD63}"/>
+                <a16:creationId xmlns:a16="http://schemas.microsoft.com/office/drawing/2014/main" id="{0DF6DBC3-4A58-42BA-9B55-A9A72510374C}"/>
               </a:ext>
             </a:extLst>
           </p:cNvPr>
@@ -2432,7 +2572,7 @@
           <p:cNvPr id="7" name="Slide Number Placeholder 6">
             <a:extLst>
               <a:ext uri="{FF2B5EF4-FFF2-40B4-BE49-F238E27FC236}">
-                <a16:creationId xmlns:a16="http://schemas.microsoft.com/office/drawing/2014/main" id="{19D5E455-FA8B-919A-9DC3-F2348341FCE7}"/>
+                <a16:creationId xmlns:a16="http://schemas.microsoft.com/office/drawing/2014/main" id="{AD4E6563-0AB6-4038-A12B-A259552DB66C}"/>
               </a:ext>
             </a:extLst>
           </p:cNvPr>
@@ -2448,7 +2588,7 @@
           <a:bodyPr/>
           <a:lstStyle/>
           <a:p>
-            <a:fld id="{068A6475-90B2-4FBC-9E20-58D309396431}" type="slidenum">
+            <a:fld id="{C01389E6-C847-4AD0-B56D-D205B2EAB1EE}" type="slidenum">
               <a:rPr lang="en-US" smtClean="0"/>
               <a:t>‹#›</a:t>
             </a:fld>
@@ -2459,13 +2599,25 @@
     </p:spTree>
     <p:extLst>
       <p:ext uri="{BB962C8B-B14F-4D97-AF65-F5344CB8AC3E}">
-        <p14:creationId xmlns:p14="http://schemas.microsoft.com/office/powerpoint/2010/main" val="1381840393"/>
+        <p14:creationId xmlns:p14="http://schemas.microsoft.com/office/powerpoint/2010/main" val="1949295010"/>
       </p:ext>
     </p:extLst>
   </p:cSld>
   <p:clrMapOvr>
     <a:masterClrMapping/>
   </p:clrMapOvr>
+  <mc:AlternateContent xmlns:mc="http://schemas.openxmlformats.org/markup-compatibility/2006" xmlns:p14="http://schemas.microsoft.com/office/powerpoint/2010/main">
+    <mc:Choice Requires="p14">
+      <p:transition spd="slow" p14:dur="1500">
+        <p:split orient="vert"/>
+      </p:transition>
+    </mc:Choice>
+    <mc:Fallback xmlns="">
+      <p:transition spd="slow">
+        <p:split orient="vert"/>
+      </p:transition>
+    </mc:Fallback>
+  </mc:AlternateContent>
 </p:sldLayout>
 </file>
 
@@ -2491,7 +2643,7 @@
           <p:cNvPr id="2" name="Title 1">
             <a:extLst>
               <a:ext uri="{FF2B5EF4-FFF2-40B4-BE49-F238E27FC236}">
-                <a16:creationId xmlns:a16="http://schemas.microsoft.com/office/drawing/2014/main" id="{9322B11B-A94F-B19C-6DBE-99ED4D840CE4}"/>
+                <a16:creationId xmlns:a16="http://schemas.microsoft.com/office/drawing/2014/main" id="{BE9702C5-1E3B-4C62-A538-59BB572864A0}"/>
               </a:ext>
             </a:extLst>
           </p:cNvPr>
@@ -2504,15 +2656,15 @@
         </p:nvSpPr>
         <p:spPr>
           <a:xfrm>
-            <a:off x="839788" y="457200"/>
-            <a:ext cx="3932237" cy="1600200"/>
+            <a:off x="1371600" y="987552"/>
+            <a:ext cx="3932237" cy="1892808"/>
           </a:xfrm>
         </p:spPr>
         <p:txBody>
           <a:bodyPr anchor="b"/>
           <a:lstStyle>
             <a:lvl1pPr>
-              <a:defRPr sz="3200"/>
+              <a:defRPr sz="3200" baseline="0"/>
             </a:lvl1pPr>
           </a:lstStyle>
           <a:p>
@@ -2520,6 +2672,7 @@
               <a:rPr lang="en-US"/>
               <a:t>Click to edit Master title style</a:t>
             </a:r>
+            <a:endParaRPr lang="en-US" dirty="0"/>
           </a:p>
         </p:txBody>
       </p:sp>
@@ -2528,7 +2681,7 @@
           <p:cNvPr id="3" name="Picture Placeholder 2">
             <a:extLst>
               <a:ext uri="{FF2B5EF4-FFF2-40B4-BE49-F238E27FC236}">
-                <a16:creationId xmlns:a16="http://schemas.microsoft.com/office/drawing/2014/main" id="{93DCDB7F-C83B-2EE6-7464-6FD66F4969F4}"/>
+                <a16:creationId xmlns:a16="http://schemas.microsoft.com/office/drawing/2014/main" id="{6E2CF574-95CE-4E60-B2CF-3B5B4F33A767}"/>
               </a:ext>
             </a:extLst>
           </p:cNvPr>
@@ -2541,8 +2694,8 @@
         </p:nvSpPr>
         <p:spPr>
           <a:xfrm>
-            <a:off x="5183188" y="987425"/>
-            <a:ext cx="6172200" cy="4873625"/>
+            <a:off x="5505319" y="987425"/>
+            <a:ext cx="5833242" cy="4873625"/>
           </a:xfrm>
         </p:spPr>
         <p:txBody>
@@ -2586,7 +2739,10 @@
             </a:lvl9pPr>
           </a:lstStyle>
           <a:p>
-            <a:endParaRPr lang="en-US"/>
+            <a:r>
+              <a:rPr lang="en-US"/>
+              <a:t>Click icon to add picture</a:t>
+            </a:r>
           </a:p>
         </p:txBody>
       </p:sp>
@@ -2595,7 +2751,7 @@
           <p:cNvPr id="4" name="Text Placeholder 3">
             <a:extLst>
               <a:ext uri="{FF2B5EF4-FFF2-40B4-BE49-F238E27FC236}">
-                <a16:creationId xmlns:a16="http://schemas.microsoft.com/office/drawing/2014/main" id="{75FE56A2-0178-3841-E151-DCFCD109D39E}"/>
+                <a16:creationId xmlns:a16="http://schemas.microsoft.com/office/drawing/2014/main" id="{6D039F7C-C735-4356-8B04-89E19047950C}"/>
               </a:ext>
             </a:extLst>
           </p:cNvPr>
@@ -2608,8 +2764,8 @@
         </p:nvSpPr>
         <p:spPr>
           <a:xfrm>
-            <a:off x="839788" y="2057400"/>
-            <a:ext cx="3932237" cy="3811588"/>
+            <a:off x="1371600" y="3033286"/>
+            <a:ext cx="3932237" cy="2835702"/>
           </a:xfrm>
         </p:spPr>
         <p:txBody>
@@ -2666,7 +2822,7 @@
           <p:cNvPr id="5" name="Date Placeholder 4">
             <a:extLst>
               <a:ext uri="{FF2B5EF4-FFF2-40B4-BE49-F238E27FC236}">
-                <a16:creationId xmlns:a16="http://schemas.microsoft.com/office/drawing/2014/main" id="{F3346E1B-2634-3A0B-B06D-BCACA54CB8CA}"/>
+                <a16:creationId xmlns:a16="http://schemas.microsoft.com/office/drawing/2014/main" id="{45E706DF-52A3-4F34-9BF5-E1ACD5D54283}"/>
               </a:ext>
             </a:extLst>
           </p:cNvPr>
@@ -2682,9 +2838,9 @@
           <a:bodyPr/>
           <a:lstStyle/>
           <a:p>
-            <a:fld id="{1A915F23-DF94-43E3-BA52-ADE72AAD8A76}" type="datetimeFigureOut">
+            <a:fld id="{3C8E4735-C637-46A3-94EB-AB3AC4188D2F}" type="datetime2">
               <a:rPr lang="en-US" smtClean="0"/>
-              <a:t>6/9/2022</a:t>
+              <a:t>Wednesday, December 7, 2022</a:t>
             </a:fld>
             <a:endParaRPr lang="en-US"/>
           </a:p>
@@ -2695,7 +2851,7 @@
           <p:cNvPr id="6" name="Footer Placeholder 5">
             <a:extLst>
               <a:ext uri="{FF2B5EF4-FFF2-40B4-BE49-F238E27FC236}">
-                <a16:creationId xmlns:a16="http://schemas.microsoft.com/office/drawing/2014/main" id="{7E7BD9BF-5C3D-BB09-744A-3B355C69078A}"/>
+                <a16:creationId xmlns:a16="http://schemas.microsoft.com/office/drawing/2014/main" id="{BFB25E53-E72E-4110-BB6B-3477F56C3088}"/>
               </a:ext>
             </a:extLst>
           </p:cNvPr>
@@ -2720,7 +2876,7 @@
           <p:cNvPr id="7" name="Slide Number Placeholder 6">
             <a:extLst>
               <a:ext uri="{FF2B5EF4-FFF2-40B4-BE49-F238E27FC236}">
-                <a16:creationId xmlns:a16="http://schemas.microsoft.com/office/drawing/2014/main" id="{6044055C-E143-7EE3-F25E-E821C7D5748F}"/>
+                <a16:creationId xmlns:a16="http://schemas.microsoft.com/office/drawing/2014/main" id="{A3686F8F-3D62-4CEC-AD9A-B70848E6A81C}"/>
               </a:ext>
             </a:extLst>
           </p:cNvPr>
@@ -2736,7 +2892,7 @@
           <a:bodyPr/>
           <a:lstStyle/>
           <a:p>
-            <a:fld id="{068A6475-90B2-4FBC-9E20-58D309396431}" type="slidenum">
+            <a:fld id="{C01389E6-C847-4AD0-B56D-D205B2EAB1EE}" type="slidenum">
               <a:rPr lang="en-US" smtClean="0"/>
               <a:t>‹#›</a:t>
             </a:fld>
@@ -2747,13 +2903,25 @@
     </p:spTree>
     <p:extLst>
       <p:ext uri="{BB962C8B-B14F-4D97-AF65-F5344CB8AC3E}">
-        <p14:creationId xmlns:p14="http://schemas.microsoft.com/office/powerpoint/2010/main" val="1075527279"/>
+        <p14:creationId xmlns:p14="http://schemas.microsoft.com/office/powerpoint/2010/main" val="3513575999"/>
       </p:ext>
     </p:extLst>
   </p:cSld>
   <p:clrMapOvr>
     <a:masterClrMapping/>
   </p:clrMapOvr>
+  <mc:AlternateContent xmlns:mc="http://schemas.openxmlformats.org/markup-compatibility/2006" xmlns:p14="http://schemas.microsoft.com/office/powerpoint/2010/main">
+    <mc:Choice Requires="p14">
+      <p:transition spd="slow" p14:dur="1500">
+        <p:split orient="vert"/>
+      </p:transition>
+    </mc:Choice>
+    <mc:Fallback xmlns="">
+      <p:transition spd="slow">
+        <p:split orient="vert"/>
+      </p:transition>
+    </mc:Fallback>
+  </mc:AlternateContent>
 </p:sldLayout>
 </file>
 
@@ -2781,10 +2949,138 @@
       </p:grpSpPr>
       <p:sp>
         <p:nvSpPr>
+          <p:cNvPr id="8" name="Rectangle 7">
+            <a:extLst>
+              <a:ext uri="{FF2B5EF4-FFF2-40B4-BE49-F238E27FC236}">
+                <a16:creationId xmlns:a16="http://schemas.microsoft.com/office/drawing/2014/main" id="{CCF2F3BB-127D-44BC-A8EF-A8BB5F5911CA}"/>
+              </a:ext>
+            </a:extLst>
+          </p:cNvPr>
+          <p:cNvSpPr/>
+          <p:nvPr/>
+        </p:nvSpPr>
+        <p:spPr>
+          <a:xfrm rot="10800000" flipH="1">
+            <a:off x="0" y="6401226"/>
+            <a:ext cx="12192000" cy="456773"/>
+          </a:xfrm>
+          <a:prstGeom prst="rect">
+            <a:avLst/>
+          </a:prstGeom>
+          <a:gradFill>
+            <a:gsLst>
+              <a:gs pos="14000">
+                <a:schemeClr val="accent4">
+                  <a:alpha val="28000"/>
+                </a:schemeClr>
+              </a:gs>
+              <a:gs pos="100000">
+                <a:schemeClr val="accent5">
+                  <a:alpha val="85000"/>
+                </a:schemeClr>
+              </a:gs>
+            </a:gsLst>
+            <a:lin ang="6000000" scaled="0"/>
+          </a:gradFill>
+          <a:ln>
+            <a:noFill/>
+          </a:ln>
+        </p:spPr>
+        <p:style>
+          <a:lnRef idx="2">
+            <a:schemeClr val="accent1">
+              <a:shade val="50000"/>
+            </a:schemeClr>
+          </a:lnRef>
+          <a:fillRef idx="1">
+            <a:schemeClr val="accent1"/>
+          </a:fillRef>
+          <a:effectRef idx="0">
+            <a:schemeClr val="accent1"/>
+          </a:effectRef>
+          <a:fontRef idx="minor">
+            <a:schemeClr val="lt1"/>
+          </a:fontRef>
+        </p:style>
+        <p:txBody>
+          <a:bodyPr rtlCol="0" anchor="ctr"/>
+          <a:lstStyle/>
+          <a:p>
+            <a:pPr algn="ctr"/>
+            <a:endParaRPr lang="en-US"/>
+          </a:p>
+        </p:txBody>
+      </p:sp>
+      <p:sp>
+        <p:nvSpPr>
+          <p:cNvPr id="10" name="Rectangle 9">
+            <a:extLst>
+              <a:ext uri="{FF2B5EF4-FFF2-40B4-BE49-F238E27FC236}">
+                <a16:creationId xmlns:a16="http://schemas.microsoft.com/office/drawing/2014/main" id="{010D1F30-F118-4A1F-A48F-7E5706959F64}"/>
+              </a:ext>
+            </a:extLst>
+          </p:cNvPr>
+          <p:cNvSpPr/>
+          <p:nvPr/>
+        </p:nvSpPr>
+        <p:spPr>
+          <a:xfrm flipH="1">
+            <a:off x="4038602" y="6401228"/>
+            <a:ext cx="8153398" cy="456772"/>
+          </a:xfrm>
+          <a:prstGeom prst="rect">
+            <a:avLst/>
+          </a:prstGeom>
+          <a:gradFill>
+            <a:gsLst>
+              <a:gs pos="9000">
+                <a:schemeClr val="accent2">
+                  <a:lumMod val="60000"/>
+                  <a:lumOff val="40000"/>
+                  <a:alpha val="55000"/>
+                </a:schemeClr>
+              </a:gs>
+              <a:gs pos="99000">
+                <a:schemeClr val="accent2"/>
+              </a:gs>
+            </a:gsLst>
+            <a:lin ang="14400000" scaled="0"/>
+          </a:gradFill>
+          <a:ln>
+            <a:noFill/>
+          </a:ln>
+        </p:spPr>
+        <p:style>
+          <a:lnRef idx="2">
+            <a:schemeClr val="accent1">
+              <a:shade val="50000"/>
+            </a:schemeClr>
+          </a:lnRef>
+          <a:fillRef idx="1">
+            <a:schemeClr val="accent1"/>
+          </a:fillRef>
+          <a:effectRef idx="0">
+            <a:schemeClr val="accent1"/>
+          </a:effectRef>
+          <a:fontRef idx="minor">
+            <a:schemeClr val="lt1"/>
+          </a:fontRef>
+        </p:style>
+        <p:txBody>
+          <a:bodyPr rtlCol="0" anchor="ctr"/>
+          <a:lstStyle/>
+          <a:p>
+            <a:pPr algn="ctr"/>
+            <a:endParaRPr lang="en-US"/>
+          </a:p>
+        </p:txBody>
+      </p:sp>
+      <p:sp>
+        <p:nvSpPr>
           <p:cNvPr id="2" name="Title Placeholder 1">
             <a:extLst>
               <a:ext uri="{FF2B5EF4-FFF2-40B4-BE49-F238E27FC236}">
-                <a16:creationId xmlns:a16="http://schemas.microsoft.com/office/drawing/2014/main" id="{5C9E92D2-C38C-2D53-D7E1-63380393A84E}"/>
+                <a16:creationId xmlns:a16="http://schemas.microsoft.com/office/drawing/2014/main" id="{17AE890C-17CE-44C0-BDED-BA68F92A845D}"/>
               </a:ext>
             </a:extLst>
           </p:cNvPr>
@@ -2797,21 +3093,21 @@
         </p:nvSpPr>
         <p:spPr>
           <a:xfrm>
-            <a:off x="838200" y="365125"/>
-            <a:ext cx="10515600" cy="1325563"/>
+            <a:off x="1371600" y="795528"/>
+            <a:ext cx="10241280" cy="1234440"/>
           </a:xfrm>
           <a:prstGeom prst="rect">
             <a:avLst/>
           </a:prstGeom>
         </p:spPr>
         <p:txBody>
-          <a:bodyPr vert="horz" lIns="91440" tIns="45720" rIns="91440" bIns="45720" rtlCol="0" anchor="ctr">
+          <a:bodyPr vert="horz" lIns="0" tIns="0" rIns="0" bIns="0" rtlCol="0" anchor="b">
             <a:normAutofit/>
           </a:bodyPr>
           <a:lstStyle/>
           <a:p>
             <a:r>
-              <a:rPr lang="en-US"/>
+              <a:rPr lang="en-US" dirty="0"/>
               <a:t>Click to edit Master title style</a:t>
             </a:r>
           </a:p>
@@ -2822,7 +3118,7 @@
           <p:cNvPr id="3" name="Text Placeholder 2">
             <a:extLst>
               <a:ext uri="{FF2B5EF4-FFF2-40B4-BE49-F238E27FC236}">
-                <a16:creationId xmlns:a16="http://schemas.microsoft.com/office/drawing/2014/main" id="{4211D9D2-B847-3011-BE31-7EF0C1B6CE1B}"/>
+                <a16:creationId xmlns:a16="http://schemas.microsoft.com/office/drawing/2014/main" id="{47910A6E-46D1-42CF-996C-2207737FB871}"/>
               </a:ext>
             </a:extLst>
           </p:cNvPr>
@@ -2835,50 +3131,50 @@
         </p:nvSpPr>
         <p:spPr>
           <a:xfrm>
-            <a:off x="838200" y="1825625"/>
-            <a:ext cx="10515600" cy="4351338"/>
+            <a:off x="1371600" y="2112264"/>
+            <a:ext cx="10241280" cy="3959352"/>
           </a:xfrm>
           <a:prstGeom prst="rect">
             <a:avLst/>
           </a:prstGeom>
         </p:spPr>
         <p:txBody>
-          <a:bodyPr vert="horz" lIns="91440" tIns="45720" rIns="91440" bIns="45720" rtlCol="0">
+          <a:bodyPr vert="horz" lIns="0" tIns="0" rIns="0" bIns="0" rtlCol="0">
             <a:normAutofit/>
           </a:bodyPr>
           <a:lstStyle/>
           <a:p>
             <a:pPr lvl="0"/>
             <a:r>
-              <a:rPr lang="en-US"/>
+              <a:rPr lang="en-US" dirty="0"/>
               <a:t>Click to edit Master text styles</a:t>
             </a:r>
           </a:p>
           <a:p>
             <a:pPr lvl="1"/>
             <a:r>
-              <a:rPr lang="en-US"/>
+              <a:rPr lang="en-US" dirty="0"/>
               <a:t>Second level</a:t>
             </a:r>
           </a:p>
           <a:p>
             <a:pPr lvl="2"/>
             <a:r>
-              <a:rPr lang="en-US"/>
+              <a:rPr lang="en-US" dirty="0"/>
               <a:t>Third level</a:t>
             </a:r>
           </a:p>
           <a:p>
             <a:pPr lvl="3"/>
             <a:r>
-              <a:rPr lang="en-US"/>
+              <a:rPr lang="en-US" dirty="0"/>
               <a:t>Fourth level</a:t>
             </a:r>
           </a:p>
           <a:p>
             <a:pPr lvl="4"/>
             <a:r>
-              <a:rPr lang="en-US"/>
+              <a:rPr lang="en-US" dirty="0"/>
               <a:t>Fifth level</a:t>
             </a:r>
           </a:p>
@@ -2889,7 +3185,7 @@
           <p:cNvPr id="4" name="Date Placeholder 3">
             <a:extLst>
               <a:ext uri="{FF2B5EF4-FFF2-40B4-BE49-F238E27FC236}">
-                <a16:creationId xmlns:a16="http://schemas.microsoft.com/office/drawing/2014/main" id="{6AA0D02E-AE83-7AE0-F581-35387085FA07}"/>
+                <a16:creationId xmlns:a16="http://schemas.microsoft.com/office/drawing/2014/main" id="{D85B5247-D236-462B-BCE0-2A24DF75B085}"/>
               </a:ext>
             </a:extLst>
           </p:cNvPr>
@@ -2902,8 +3198,8 @@
         </p:nvSpPr>
         <p:spPr>
           <a:xfrm>
-            <a:off x="838200" y="6356350"/>
-            <a:ext cx="2743200" cy="365125"/>
+            <a:off x="7909560" y="6409944"/>
+            <a:ext cx="3703320" cy="448056"/>
           </a:xfrm>
           <a:prstGeom prst="rect">
             <a:avLst/>
@@ -2912,22 +3208,21 @@
         <p:txBody>
           <a:bodyPr vert="horz" lIns="91440" tIns="45720" rIns="91440" bIns="45720" rtlCol="0" anchor="ctr"/>
           <a:lstStyle>
-            <a:lvl1pPr algn="l">
-              <a:defRPr sz="1200">
+            <a:lvl1pPr algn="r">
+              <a:defRPr sz="800" cap="all" spc="300" baseline="0">
                 <a:solidFill>
-                  <a:schemeClr val="tx1">
-                    <a:tint val="75000"/>
-                  </a:schemeClr>
+                  <a:srgbClr val="FFFFFF"/>
                 </a:solidFill>
               </a:defRPr>
             </a:lvl1pPr>
           </a:lstStyle>
           <a:p>
-            <a:fld id="{1A915F23-DF94-43E3-BA52-ADE72AAD8A76}" type="datetimeFigureOut">
+            <a:fld id="{AE0C963C-C1DB-4AFD-9DDC-0691666BF49B}" type="datetime2">
               <a:rPr lang="en-US" smtClean="0"/>
-              <a:t>6/9/2022</a:t>
+              <a:pPr/>
+              <a:t>Wednesday, December 7, 2022</a:t>
             </a:fld>
-            <a:endParaRPr lang="en-US"/>
+            <a:endParaRPr lang="en-US" cap="all" dirty="0"/>
           </a:p>
         </p:txBody>
       </p:sp>
@@ -2936,7 +3231,7 @@
           <p:cNvPr id="5" name="Footer Placeholder 4">
             <a:extLst>
               <a:ext uri="{FF2B5EF4-FFF2-40B4-BE49-F238E27FC236}">
-                <a16:creationId xmlns:a16="http://schemas.microsoft.com/office/drawing/2014/main" id="{F01E5658-B032-33D3-6E5A-969D02983354}"/>
+                <a16:creationId xmlns:a16="http://schemas.microsoft.com/office/drawing/2014/main" id="{19155C58-7DDF-4CD4-96AD-F9CC844D84CC}"/>
               </a:ext>
             </a:extLst>
           </p:cNvPr>
@@ -2948,9 +3243,9 @@
           </p:nvPr>
         </p:nvSpPr>
         <p:spPr>
-          <a:xfrm>
-            <a:off x="4038600" y="6356350"/>
-            <a:ext cx="4114800" cy="365125"/>
+          <a:xfrm rot="5400000">
+            <a:off x="-1828800" y="1911096"/>
+            <a:ext cx="4114800" cy="457200"/>
           </a:xfrm>
           <a:prstGeom prst="rect">
             <a:avLst/>
@@ -2959,17 +3254,17 @@
         <p:txBody>
           <a:bodyPr vert="horz" lIns="91440" tIns="45720" rIns="91440" bIns="45720" rtlCol="0" anchor="ctr"/>
           <a:lstStyle>
-            <a:lvl1pPr algn="ctr">
-              <a:defRPr sz="1200">
+            <a:lvl1pPr algn="l">
+              <a:defRPr sz="800" b="1">
                 <a:solidFill>
-                  <a:schemeClr val="tx1">
-                    <a:tint val="75000"/>
-                  </a:schemeClr>
+                  <a:schemeClr val="tx1"/>
                 </a:solidFill>
+                <a:latin typeface="+mj-lt"/>
               </a:defRPr>
             </a:lvl1pPr>
           </a:lstStyle>
           <a:p>
+            <a:pPr algn="l"/>
             <a:endParaRPr lang="en-US"/>
           </a:p>
         </p:txBody>
@@ -2979,7 +3274,7 @@
           <p:cNvPr id="6" name="Slide Number Placeholder 5">
             <a:extLst>
               <a:ext uri="{FF2B5EF4-FFF2-40B4-BE49-F238E27FC236}">
-                <a16:creationId xmlns:a16="http://schemas.microsoft.com/office/drawing/2014/main" id="{76BF3889-3A5B-C896-BF25-415E9946AAE6}"/>
+                <a16:creationId xmlns:a16="http://schemas.microsoft.com/office/drawing/2014/main" id="{6F495647-A849-45D9-BC71-46A12E6DE479}"/>
               </a:ext>
             </a:extLst>
           </p:cNvPr>
@@ -2992,8 +3287,8 @@
         </p:nvSpPr>
         <p:spPr>
           <a:xfrm>
-            <a:off x="8610600" y="6356350"/>
-            <a:ext cx="2743200" cy="365125"/>
+            <a:off x="11667744" y="6409944"/>
+            <a:ext cx="438912" cy="448056"/>
           </a:xfrm>
           <a:prstGeom prst="rect">
             <a:avLst/>
@@ -3003,56 +3298,68 @@
           <a:bodyPr vert="horz" lIns="91440" tIns="45720" rIns="91440" bIns="45720" rtlCol="0" anchor="ctr"/>
           <a:lstStyle>
             <a:lvl1pPr algn="r">
-              <a:defRPr sz="1200">
+              <a:defRPr sz="800">
                 <a:solidFill>
-                  <a:schemeClr val="tx1">
-                    <a:tint val="75000"/>
-                  </a:schemeClr>
+                  <a:srgbClr val="FFFFFF"/>
                 </a:solidFill>
               </a:defRPr>
             </a:lvl1pPr>
           </a:lstStyle>
           <a:p>
-            <a:fld id="{068A6475-90B2-4FBC-9E20-58D309396431}" type="slidenum">
+            <a:fld id="{C01389E6-C847-4AD0-B56D-D205B2EAB1EE}" type="slidenum">
               <a:rPr lang="en-US" smtClean="0"/>
+              <a:pPr/>
               <a:t>‹#›</a:t>
             </a:fld>
-            <a:endParaRPr lang="en-US"/>
+            <a:endParaRPr lang="en-US" sz="800" dirty="0"/>
           </a:p>
         </p:txBody>
       </p:sp>
     </p:spTree>
     <p:extLst>
       <p:ext uri="{BB962C8B-B14F-4D97-AF65-F5344CB8AC3E}">
-        <p14:creationId xmlns:p14="http://schemas.microsoft.com/office/powerpoint/2010/main" val="1496618792"/>
+        <p14:creationId xmlns:p14="http://schemas.microsoft.com/office/powerpoint/2010/main" val="1065805526"/>
       </p:ext>
     </p:extLst>
   </p:cSld>
   <p:clrMap bg1="lt1" tx1="dk1" bg2="lt2" tx2="dk2" accent1="accent1" accent2="accent2" accent3="accent3" accent4="accent4" accent5="accent5" accent6="accent6" hlink="hlink" folHlink="folHlink"/>
   <p:sldLayoutIdLst>
-    <p:sldLayoutId id="2147483649" r:id="rId1"/>
-    <p:sldLayoutId id="2147483650" r:id="rId2"/>
-    <p:sldLayoutId id="2147483651" r:id="rId3"/>
-    <p:sldLayoutId id="2147483652" r:id="rId4"/>
-    <p:sldLayoutId id="2147483653" r:id="rId5"/>
-    <p:sldLayoutId id="2147483654" r:id="rId6"/>
-    <p:sldLayoutId id="2147483655" r:id="rId7"/>
-    <p:sldLayoutId id="2147483656" r:id="rId8"/>
-    <p:sldLayoutId id="2147483657" r:id="rId9"/>
-    <p:sldLayoutId id="2147483658" r:id="rId10"/>
-    <p:sldLayoutId id="2147483659" r:id="rId11"/>
+    <p:sldLayoutId id="2147483661" r:id="rId1"/>
+    <p:sldLayoutId id="2147483662" r:id="rId2"/>
+    <p:sldLayoutId id="2147483663" r:id="rId3"/>
+    <p:sldLayoutId id="2147483664" r:id="rId4"/>
+    <p:sldLayoutId id="2147483665" r:id="rId5"/>
+    <p:sldLayoutId id="2147483666" r:id="rId6"/>
+    <p:sldLayoutId id="2147483667" r:id="rId7"/>
+    <p:sldLayoutId id="2147483668" r:id="rId8"/>
+    <p:sldLayoutId id="2147483669" r:id="rId9"/>
+    <p:sldLayoutId id="2147483670" r:id="rId10"/>
+    <p:sldLayoutId id="2147483671" r:id="rId11"/>
   </p:sldLayoutIdLst>
+  <mc:AlternateContent xmlns:mc="http://schemas.openxmlformats.org/markup-compatibility/2006" xmlns:p14="http://schemas.microsoft.com/office/powerpoint/2010/main">
+    <mc:Choice Requires="p14">
+      <p:transition spd="slow" p14:dur="1500">
+        <p:split orient="vert"/>
+      </p:transition>
+    </mc:Choice>
+    <mc:Fallback xmlns="">
+      <p:transition spd="slow">
+        <p:split orient="vert"/>
+      </p:transition>
+    </mc:Fallback>
+  </mc:AlternateContent>
+  <p:hf sldNum="0" hdr="0" ftr="0" dt="0"/>
   <p:txStyles>
     <p:titleStyle>
       <a:lvl1pPr algn="l" defTabSz="914400" rtl="0" eaLnBrk="1" latinLnBrk="0" hangingPunct="1">
         <a:lnSpc>
-          <a:spcPct val="90000"/>
+          <a:spcPct val="100000"/>
         </a:lnSpc>
         <a:spcBef>
           <a:spcPct val="0"/>
         </a:spcBef>
         <a:buNone/>
-        <a:defRPr sz="4400" kern="1200">
+        <a:defRPr sz="3600" b="1" i="0" kern="1200" cap="all" spc="700" baseline="0">
           <a:solidFill>
             <a:schemeClr val="tx1"/>
           </a:solidFill>
@@ -3065,14 +3372,14 @@
     <p:bodyStyle>
       <a:lvl1pPr marL="228600" indent="-228600" algn="l" defTabSz="914400" rtl="0" eaLnBrk="1" latinLnBrk="0" hangingPunct="1">
         <a:lnSpc>
-          <a:spcPct val="90000"/>
+          <a:spcPct val="120000"/>
         </a:lnSpc>
         <a:spcBef>
           <a:spcPts val="1000"/>
         </a:spcBef>
         <a:buFont typeface="Arial" panose="020B0604020202020204" pitchFamily="34" charset="0"/>
         <a:buChar char="•"/>
-        <a:defRPr sz="2800" kern="1200">
+        <a:defRPr sz="2000" kern="1200">
           <a:solidFill>
             <a:schemeClr val="tx1"/>
           </a:solidFill>
@@ -3083,25 +3390,7 @@
       </a:lvl1pPr>
       <a:lvl2pPr marL="685800" indent="-228600" algn="l" defTabSz="914400" rtl="0" eaLnBrk="1" latinLnBrk="0" hangingPunct="1">
         <a:lnSpc>
-          <a:spcPct val="90000"/>
-        </a:lnSpc>
-        <a:spcBef>
-          <a:spcPts val="500"/>
-        </a:spcBef>
-        <a:buFont typeface="Arial" panose="020B0604020202020204" pitchFamily="34" charset="0"/>
-        <a:buChar char="•"/>
-        <a:defRPr sz="2400" kern="1200">
-          <a:solidFill>
-            <a:schemeClr val="tx1"/>
-          </a:solidFill>
-          <a:latin typeface="+mn-lt"/>
-          <a:ea typeface="+mn-ea"/>
-          <a:cs typeface="+mn-cs"/>
-        </a:defRPr>
-      </a:lvl2pPr>
-      <a:lvl3pPr marL="1143000" indent="-228600" algn="l" defTabSz="914400" rtl="0" eaLnBrk="1" latinLnBrk="0" hangingPunct="1">
-        <a:lnSpc>
-          <a:spcPct val="90000"/>
+          <a:spcPct val="120000"/>
         </a:lnSpc>
         <a:spcBef>
           <a:spcPts val="500"/>
@@ -3116,10 +3405,10 @@
           <a:ea typeface="+mn-ea"/>
           <a:cs typeface="+mn-cs"/>
         </a:defRPr>
-      </a:lvl3pPr>
-      <a:lvl4pPr marL="1600200" indent="-228600" algn="l" defTabSz="914400" rtl="0" eaLnBrk="1" latinLnBrk="0" hangingPunct="1">
+      </a:lvl2pPr>
+      <a:lvl3pPr marL="1143000" indent="-228600" algn="l" defTabSz="914400" rtl="0" eaLnBrk="1" latinLnBrk="0" hangingPunct="1">
         <a:lnSpc>
-          <a:spcPct val="90000"/>
+          <a:spcPct val="120000"/>
         </a:lnSpc>
         <a:spcBef>
           <a:spcPts val="500"/>
@@ -3134,17 +3423,35 @@
           <a:ea typeface="+mn-ea"/>
           <a:cs typeface="+mn-cs"/>
         </a:defRPr>
-      </a:lvl4pPr>
-      <a:lvl5pPr marL="2057400" indent="-228600" algn="l" defTabSz="914400" rtl="0" eaLnBrk="1" latinLnBrk="0" hangingPunct="1">
+      </a:lvl3pPr>
+      <a:lvl4pPr marL="1600200" indent="-228600" algn="l" defTabSz="914400" rtl="0" eaLnBrk="1" latinLnBrk="0" hangingPunct="1">
         <a:lnSpc>
-          <a:spcPct val="90000"/>
+          <a:spcPct val="120000"/>
         </a:lnSpc>
         <a:spcBef>
           <a:spcPts val="500"/>
         </a:spcBef>
         <a:buFont typeface="Arial" panose="020B0604020202020204" pitchFamily="34" charset="0"/>
         <a:buChar char="•"/>
-        <a:defRPr sz="1800" kern="1200">
+        <a:defRPr sz="1600" kern="1200">
+          <a:solidFill>
+            <a:schemeClr val="tx1"/>
+          </a:solidFill>
+          <a:latin typeface="+mn-lt"/>
+          <a:ea typeface="+mn-ea"/>
+          <a:cs typeface="+mn-cs"/>
+        </a:defRPr>
+      </a:lvl4pPr>
+      <a:lvl5pPr marL="2057400" indent="-228600" algn="l" defTabSz="914400" rtl="0" eaLnBrk="1" latinLnBrk="0" hangingPunct="1">
+        <a:lnSpc>
+          <a:spcPct val="120000"/>
+        </a:lnSpc>
+        <a:spcBef>
+          <a:spcPts val="500"/>
+        </a:spcBef>
+        <a:buFont typeface="Arial" panose="020B0604020202020204" pitchFamily="34" charset="0"/>
+        <a:buChar char="•"/>
+        <a:defRPr sz="1600" kern="1200">
           <a:solidFill>
             <a:schemeClr val="tx1"/>
           </a:solidFill>
@@ -4118,7 +4425,7 @@
         </p:spPr>
         <p:txBody>
           <a:bodyPr anchor="ctr">
-            <a:normAutofit/>
+            <a:normAutofit lnSpcReduction="10000"/>
           </a:bodyPr>
           <a:lstStyle/>
           <a:p>
@@ -5704,7 +6011,7 @@
         </p:spPr>
         <p:txBody>
           <a:bodyPr>
-            <a:normAutofit/>
+            <a:normAutofit lnSpcReduction="10000"/>
           </a:bodyPr>
           <a:lstStyle/>
           <a:p>
@@ -6078,150 +6385,56 @@
 </file>
 
 <file path=ppt/theme/theme1.xml><?xml version="1.0" encoding="utf-8"?>
-<a:theme xmlns:a="http://schemas.openxmlformats.org/drawingml/2006/main" name="Office Theme">
+<a:theme xmlns:a="http://schemas.openxmlformats.org/drawingml/2006/main" name="GradientRiseVTI">
   <a:themeElements>
-    <a:clrScheme name="Office">
+    <a:clrScheme name="AnalogousFromLightSeedRightStep">
       <a:dk1>
-        <a:sysClr val="windowText" lastClr="000000"/>
+        <a:srgbClr val="000000"/>
       </a:dk1>
       <a:lt1>
-        <a:sysClr val="window" lastClr="FFFFFF"/>
+        <a:srgbClr val="FFFFFF"/>
       </a:lt1>
       <a:dk2>
-        <a:srgbClr val="44546A"/>
+        <a:srgbClr val="413424"/>
       </a:dk2>
       <a:lt2>
-        <a:srgbClr val="E7E6E6"/>
+        <a:srgbClr val="E2E5E8"/>
       </a:lt2>
       <a:accent1>
-        <a:srgbClr val="4472C4"/>
+        <a:srgbClr val="D19651"/>
       </a:accent1>
       <a:accent2>
-        <a:srgbClr val="ED7D31"/>
+        <a:srgbClr val="A9A64F"/>
       </a:accent2>
       <a:accent3>
-        <a:srgbClr val="A5A5A5"/>
+        <a:srgbClr val="90AB63"/>
       </a:accent3>
       <a:accent4>
-        <a:srgbClr val="FFC000"/>
+        <a:srgbClr val="66B253"/>
       </a:accent4>
       <a:accent5>
-        <a:srgbClr val="5B9BD5"/>
+        <a:srgbClr val="58B46B"/>
       </a:accent5>
       <a:accent6>
-        <a:srgbClr val="70AD47"/>
+        <a:srgbClr val="53B28E"/>
       </a:accent6>
       <a:hlink>
-        <a:srgbClr val="0563C1"/>
+        <a:srgbClr val="6283AA"/>
       </a:hlink>
       <a:folHlink>
-        <a:srgbClr val="954F72"/>
+        <a:srgbClr val="7F7F7F"/>
       </a:folHlink>
     </a:clrScheme>
-    <a:fontScheme name="Office">
+    <a:fontScheme name="Avenir">
       <a:majorFont>
-        <a:latin typeface="Calibri Light" panose="020F0302020204030204"/>
+        <a:latin typeface="Gill Sans Nova"/>
         <a:ea typeface=""/>
         <a:cs typeface=""/>
-        <a:font script="Jpan" typeface="游ゴシック Light"/>
-        <a:font script="Hang" typeface="맑은 고딕"/>
-        <a:font script="Hans" typeface="等线 Light"/>
-        <a:font script="Hant" typeface="新細明體"/>
-        <a:font script="Arab" typeface="Times New Roman"/>
-        <a:font script="Hebr" typeface="Times New Roman"/>
-        <a:font script="Thai" typeface="Angsana New"/>
-        <a:font script="Ethi" typeface="Nyala"/>
-        <a:font script="Beng" typeface="Vrinda"/>
-        <a:font script="Gujr" typeface="Shruti"/>
-        <a:font script="Khmr" typeface="MoolBoran"/>
-        <a:font script="Knda" typeface="Tunga"/>
-        <a:font script="Guru" typeface="Raavi"/>
-        <a:font script="Cans" typeface="Euphemia"/>
-        <a:font script="Cher" typeface="Plantagenet Cherokee"/>
-        <a:font script="Yiii" typeface="Microsoft Yi Baiti"/>
-        <a:font script="Tibt" typeface="Microsoft Himalaya"/>
-        <a:font script="Thaa" typeface="MV Boli"/>
-        <a:font script="Deva" typeface="Mangal"/>
-        <a:font script="Telu" typeface="Gautami"/>
-        <a:font script="Taml" typeface="Latha"/>
-        <a:font script="Syrc" typeface="Estrangelo Edessa"/>
-        <a:font script="Orya" typeface="Kalinga"/>
-        <a:font script="Mlym" typeface="Kartika"/>
-        <a:font script="Laoo" typeface="DokChampa"/>
-        <a:font script="Sinh" typeface="Iskoola Pota"/>
-        <a:font script="Mong" typeface="Mongolian Baiti"/>
-        <a:font script="Viet" typeface="Times New Roman"/>
-        <a:font script="Uigh" typeface="Microsoft Uighur"/>
-        <a:font script="Geor" typeface="Sylfaen"/>
-        <a:font script="Armn" typeface="Arial"/>
-        <a:font script="Bugi" typeface="Leelawadee UI"/>
-        <a:font script="Bopo" typeface="Microsoft JhengHei"/>
-        <a:font script="Java" typeface="Javanese Text"/>
-        <a:font script="Lisu" typeface="Segoe UI"/>
-        <a:font script="Mymr" typeface="Myanmar Text"/>
-        <a:font script="Nkoo" typeface="Ebrima"/>
-        <a:font script="Olck" typeface="Nirmala UI"/>
-        <a:font script="Osma" typeface="Ebrima"/>
-        <a:font script="Phag" typeface="Phagspa"/>
-        <a:font script="Syrn" typeface="Estrangelo Edessa"/>
-        <a:font script="Syrj" typeface="Estrangelo Edessa"/>
-        <a:font script="Syre" typeface="Estrangelo Edessa"/>
-        <a:font script="Sora" typeface="Nirmala UI"/>
-        <a:font script="Tale" typeface="Microsoft Tai Le"/>
-        <a:font script="Talu" typeface="Microsoft New Tai Lue"/>
-        <a:font script="Tfng" typeface="Ebrima"/>
       </a:majorFont>
       <a:minorFont>
-        <a:latin typeface="Calibri" panose="020F0502020204030204"/>
+        <a:latin typeface="Gill Sans Nova"/>
         <a:ea typeface=""/>
         <a:cs typeface=""/>
-        <a:font script="Jpan" typeface="游ゴシック"/>
-        <a:font script="Hang" typeface="맑은 고딕"/>
-        <a:font script="Hans" typeface="等线"/>
-        <a:font script="Hant" typeface="新細明體"/>
-        <a:font script="Arab" typeface="Arial"/>
-        <a:font script="Hebr" typeface="Arial"/>
-        <a:font script="Thai" typeface="Cordia New"/>
-        <a:font script="Ethi" typeface="Nyala"/>
-        <a:font script="Beng" typeface="Vrinda"/>
-        <a:font script="Gujr" typeface="Shruti"/>
-        <a:font script="Khmr" typeface="DaunPenh"/>
-        <a:font script="Knda" typeface="Tunga"/>
-        <a:font script="Guru" typeface="Raavi"/>
-        <a:font script="Cans" typeface="Euphemia"/>
-        <a:font script="Cher" typeface="Plantagenet Cherokee"/>
-        <a:font script="Yiii" typeface="Microsoft Yi Baiti"/>
-        <a:font script="Tibt" typeface="Microsoft Himalaya"/>
-        <a:font script="Thaa" typeface="MV Boli"/>
-        <a:font script="Deva" typeface="Mangal"/>
-        <a:font script="Telu" typeface="Gautami"/>
-        <a:font script="Taml" typeface="Latha"/>
-        <a:font script="Syrc" typeface="Estrangelo Edessa"/>
-        <a:font script="Orya" typeface="Kalinga"/>
-        <a:font script="Mlym" typeface="Kartika"/>
-        <a:font script="Laoo" typeface="DokChampa"/>
-        <a:font script="Sinh" typeface="Iskoola Pota"/>
-        <a:font script="Mong" typeface="Mongolian Baiti"/>
-        <a:font script="Viet" typeface="Arial"/>
-        <a:font script="Uigh" typeface="Microsoft Uighur"/>
-        <a:font script="Geor" typeface="Sylfaen"/>
-        <a:font script="Armn" typeface="Arial"/>
-        <a:font script="Bugi" typeface="Leelawadee UI"/>
-        <a:font script="Bopo" typeface="Microsoft JhengHei"/>
-        <a:font script="Java" typeface="Javanese Text"/>
-        <a:font script="Lisu" typeface="Segoe UI"/>
-        <a:font script="Mymr" typeface="Myanmar Text"/>
-        <a:font script="Nkoo" typeface="Ebrima"/>
-        <a:font script="Olck" typeface="Nirmala UI"/>
-        <a:font script="Osma" typeface="Ebrima"/>
-        <a:font script="Phag" typeface="Phagspa"/>
-        <a:font script="Syrn" typeface="Estrangelo Edessa"/>
-        <a:font script="Syrj" typeface="Estrangelo Edessa"/>
-        <a:font script="Syre" typeface="Estrangelo Edessa"/>
-        <a:font script="Sora" typeface="Nirmala UI"/>
-        <a:font script="Tale" typeface="Microsoft Tai Le"/>
-        <a:font script="Talu" typeface="Microsoft New Tai Lue"/>
-        <a:font script="Tfng" typeface="Ebrima"/>
       </a:minorFont>
     </a:fontScheme>
     <a:fmtScheme name="Office">
@@ -6366,7 +6579,7 @@
   <a:extraClrSchemeLst/>
   <a:extLst>
     <a:ext uri="{05A4C25C-085E-4340-85A3-A5531E510DB2}">
-      <thm15:themeFamily xmlns:thm15="http://schemas.microsoft.com/office/thememl/2012/main" name="Office Theme" id="{62F939B6-93AF-4DB8-9C6B-D6C7DFDC589F}" vid="{4A3C46E8-61CC-4603-A589-7422A47A8E4A}"/>
+      <thm15:themeFamily xmlns:thm15="http://schemas.microsoft.com/office/thememl/2012/main" name="GradientRiseVTI" id="{C2FC082F-B444-4222-AF20-78444CCB5722}" vid="{39F213E4-0CBC-40CB-B3F6-8C5562B6B99A}"/>
     </a:ext>
   </a:extLst>
 </a:theme>

</xml_diff>